<commit_message>
Revised 3.1 based on notes
</commit_message>
<xml_diff>
--- a/Slides/Lesson 3.1 Requirements Gathering.pptx
+++ b/Slides/Lesson 3.1 Requirements Gathering.pptx
@@ -12,21 +12,21 @@
     <p:sldId id="355" r:id="rId3"/>
     <p:sldId id="396" r:id="rId4"/>
     <p:sldId id="397" r:id="rId5"/>
-    <p:sldId id="488" r:id="rId6"/>
-    <p:sldId id="351" r:id="rId7"/>
-    <p:sldId id="377" r:id="rId8"/>
-    <p:sldId id="378" r:id="rId9"/>
-    <p:sldId id="398" r:id="rId10"/>
-    <p:sldId id="489" r:id="rId11"/>
-    <p:sldId id="490" r:id="rId12"/>
-    <p:sldId id="495" r:id="rId13"/>
-    <p:sldId id="491" r:id="rId14"/>
-    <p:sldId id="492" r:id="rId15"/>
-    <p:sldId id="493" r:id="rId16"/>
-    <p:sldId id="405" r:id="rId17"/>
-    <p:sldId id="494" r:id="rId18"/>
-    <p:sldId id="496" r:id="rId19"/>
-    <p:sldId id="497" r:id="rId20"/>
+    <p:sldId id="351" r:id="rId6"/>
+    <p:sldId id="377" r:id="rId7"/>
+    <p:sldId id="378" r:id="rId8"/>
+    <p:sldId id="398" r:id="rId9"/>
+    <p:sldId id="494" r:id="rId10"/>
+    <p:sldId id="496" r:id="rId11"/>
+    <p:sldId id="489" r:id="rId12"/>
+    <p:sldId id="490" r:id="rId13"/>
+    <p:sldId id="495" r:id="rId14"/>
+    <p:sldId id="491" r:id="rId15"/>
+    <p:sldId id="492" r:id="rId16"/>
+    <p:sldId id="493" r:id="rId17"/>
+    <p:sldId id="405" r:id="rId18"/>
+    <p:sldId id="497" r:id="rId19"/>
+    <p:sldId id="498" r:id="rId20"/>
   </p:sldIdLst>
   <p:sldSz cx="12192000" cy="6858000"/>
   <p:notesSz cx="6858000" cy="9144000"/>
@@ -155,11 +155,12 @@
             <p14:sldId id="355"/>
             <p14:sldId id="396"/>
             <p14:sldId id="397"/>
-            <p14:sldId id="488"/>
             <p14:sldId id="351"/>
             <p14:sldId id="377"/>
             <p14:sldId id="378"/>
             <p14:sldId id="398"/>
+            <p14:sldId id="494"/>
+            <p14:sldId id="496"/>
             <p14:sldId id="489"/>
             <p14:sldId id="490"/>
             <p14:sldId id="495"/>
@@ -167,9 +168,8 @@
             <p14:sldId id="492"/>
             <p14:sldId id="493"/>
             <p14:sldId id="405"/>
-            <p14:sldId id="494"/>
-            <p14:sldId id="496"/>
             <p14:sldId id="497"/>
+            <p14:sldId id="498"/>
           </p14:sldIdLst>
         </p14:section>
       </p14:sectionLst>
@@ -1242,8 +1242,8 @@
             </a:lnSpc>
           </a:pPr>
           <a:r>
-            <a:rPr lang="en-US"/>
-            <a:t>Problems of volatility</a:t>
+            <a:rPr lang="en-US" dirty="0"/>
+            <a:t>Problems of variability</a:t>
           </a:r>
         </a:p>
       </dgm:t>
@@ -2185,8 +2185,8 @@
             <a:buNone/>
           </a:pPr>
           <a:r>
-            <a:rPr lang="en-US" sz="2500" kern="1200"/>
-            <a:t>Problems of volatility</a:t>
+            <a:rPr lang="en-US" sz="2500" kern="1200" dirty="0"/>
+            <a:t>Problems of variability</a:t>
           </a:r>
         </a:p>
       </dsp:txBody>
@@ -3669,7 +3669,7 @@
           <a:p>
             <a:fld id="{7C7E5181-6CF5-45F7-A87A-E0E0B1FD7549}" type="datetimeFigureOut">
               <a:rPr lang="en-US" smtClean="0"/>
-              <a:t>1/25/22</a:t>
+              <a:t>1/26/22</a:t>
             </a:fld>
             <a:endParaRPr lang="en-US"/>
           </a:p>
@@ -4083,7 +4083,7 @@
             </a:pPr>
             <a:r>
               <a:rPr lang="en-US" dirty="0"/>
-              <a:t>One way to specify requirements is with a formal specification. That is, you specify all possible inputs and all expected outputs and side effects.</a:t>
+              <a:t>Non-functional requirements might also impact the static existence of the system, or its evolution.</a:t>
             </a:r>
           </a:p>
           <a:p>
@@ -4124,10 +4124,7 @@
               <a:tabLst/>
               <a:defRPr/>
             </a:pPr>
-            <a:r>
-              <a:rPr lang="en-US" dirty="0"/>
-              <a:t>Here is an example of the specification for HTTP. You can tell that it is “formal” because it includes a definitions section that goes so far as to clarify the usage of the term “MUST” or “SHOULD”, plus domain-specific terms like “connection” and “message”. The specification aims to have no ambiguities, whatsoever.</a:t>
-            </a:r>
+            <a:endParaRPr lang="en-US" dirty="0"/>
           </a:p>
           <a:p>
             <a:pPr marL="0" marR="0" lvl="0" indent="0" algn="l" defTabSz="914400" rtl="0" eaLnBrk="1" fontAlgn="auto" latinLnBrk="0" hangingPunct="1">
@@ -4147,55 +4144,9 @@
               <a:tabLst/>
               <a:defRPr/>
             </a:pPr>
-            <a:endParaRPr lang="en-US" dirty="0"/>
-          </a:p>
-          <a:p>
-            <a:pPr marL="0" marR="0" lvl="0" indent="0" algn="l" defTabSz="914400" rtl="0" eaLnBrk="1" fontAlgn="auto" latinLnBrk="0" hangingPunct="1">
-              <a:lnSpc>
-                <a:spcPct val="100000"/>
-              </a:lnSpc>
-              <a:spcBef>
-                <a:spcPts val="0"/>
-              </a:spcBef>
-              <a:spcAft>
-                <a:spcPts val="0"/>
-              </a:spcAft>
-              <a:buClrTx/>
-              <a:buSzTx/>
-              <a:buFontTx/>
-              <a:buNone/>
-              <a:tabLst/>
-              <a:defRPr/>
-            </a:pPr>
-            <a:r>
-              <a:rPr lang="en-US" dirty="0"/>
-              <a:t>Ask class: When would such a specification be desirable?</a:t>
-            </a:r>
-          </a:p>
-          <a:p>
-            <a:r>
-              <a:rPr lang="en-US" dirty="0"/>
-              <a:t>Examples:</a:t>
-            </a:r>
-          </a:p>
-          <a:p>
-            <a:pPr marL="171450" indent="-171450">
-              <a:buFont typeface="Arial" panose="020B0604020202020204" pitchFamily="34" charset="0"/>
-              <a:buChar char="•"/>
-            </a:pPr>
-            <a:r>
-              <a:rPr lang="en-US" dirty="0"/>
-              <a:t>Well, obviously for HTTP (on the slide), and similarly for other protocols that require interoperability: want to make sure that a different team can implement a browser from a server from a caching proxy or content filter</a:t>
-            </a:r>
-          </a:p>
-          <a:p>
-            <a:pPr marL="171450" indent="-171450">
-              <a:buFont typeface="Arial" panose="020B0604020202020204" pitchFamily="34" charset="0"/>
-              <a:buChar char="•"/>
-            </a:pPr>
-            <a:r>
-              <a:rPr lang="en-US" dirty="0"/>
-              <a:t>Safety-critical systems (someone’s life is at risk; want to have formal review of formal specs)</a:t>
+            <a:r>
+              <a:rPr lang="en-US" dirty="0"/>
+              <a:t>For example, if a customer intends for your software to be particularly long-lasting, and to be able to be extended – this needs to be said. Similarly, if there are specific testing requirements that your customer needs to comply with, there may be testability requirements, that define the effort needed to test the behaviors of that system.</a:t>
             </a:r>
           </a:p>
         </p:txBody>
@@ -4226,7 +4177,7 @@
     </p:spTree>
     <p:extLst>
       <p:ext uri="{BB962C8B-B14F-4D97-AF65-F5344CB8AC3E}">
-        <p14:creationId xmlns:p14="http://schemas.microsoft.com/office/powerpoint/2010/main" val="2101111716"/>
+        <p14:creationId xmlns:p14="http://schemas.microsoft.com/office/powerpoint/2010/main" val="3523526305"/>
       </p:ext>
     </p:extLst>
   </p:cSld>
@@ -4280,45 +4231,138 @@
           <a:bodyPr/>
           <a:lstStyle/>
           <a:p>
-            <a:r>
-              <a:rPr lang="en-US" dirty="0"/>
-              <a:t>User stories are another approach for documenting requirements, which are structured to put the user first. A user story is a short simple description of ONE feature that can fit on a 3x5” card, written in the user’s language.</a:t>
-            </a:r>
-          </a:p>
-          <a:p>
+            <a:pPr marL="0" marR="0" lvl="0" indent="0" algn="l" defTabSz="914400" rtl="0" eaLnBrk="1" fontAlgn="auto" latinLnBrk="0" hangingPunct="1">
+              <a:lnSpc>
+                <a:spcPct val="100000"/>
+              </a:lnSpc>
+              <a:spcBef>
+                <a:spcPts val="0"/>
+              </a:spcBef>
+              <a:spcAft>
+                <a:spcPts val="0"/>
+              </a:spcAft>
+              <a:buClrTx/>
+              <a:buSzTx/>
+              <a:buFontTx/>
+              <a:buNone/>
+              <a:tabLst/>
+              <a:defRPr/>
+            </a:pPr>
+            <a:r>
+              <a:rPr lang="en-US" dirty="0"/>
+              <a:t>One way to specify requirements is with a formal specification. That is, you specify all possible inputs and all expected outputs and side effects.</a:t>
+            </a:r>
+          </a:p>
+          <a:p>
+            <a:pPr marL="0" marR="0" lvl="0" indent="0" algn="l" defTabSz="914400" rtl="0" eaLnBrk="1" fontAlgn="auto" latinLnBrk="0" hangingPunct="1">
+              <a:lnSpc>
+                <a:spcPct val="100000"/>
+              </a:lnSpc>
+              <a:spcBef>
+                <a:spcPts val="0"/>
+              </a:spcBef>
+              <a:spcAft>
+                <a:spcPts val="0"/>
+              </a:spcAft>
+              <a:buClrTx/>
+              <a:buSzTx/>
+              <a:buFontTx/>
+              <a:buNone/>
+              <a:tabLst/>
+              <a:defRPr/>
+            </a:pPr>
             <a:endParaRPr lang="en-US" dirty="0"/>
           </a:p>
           <a:p>
-            <a:r>
-              <a:rPr lang="en-US" dirty="0"/>
-              <a:t>Why do we focus on the value? Because ultimately our goal with building software is presumably to deliver value – do something that helps some user accomplish some goal. That “something of value” is really what the requirement is. The customer probably doesn’t care to define every possible output for their system for every possible input – instead they just want to tell you what they want to have happen, in language that is as close to their own as possible.</a:t>
-            </a:r>
-          </a:p>
-          <a:p>
+            <a:pPr marL="0" marR="0" lvl="0" indent="0" algn="l" defTabSz="914400" rtl="0" eaLnBrk="1" fontAlgn="auto" latinLnBrk="0" hangingPunct="1">
+              <a:lnSpc>
+                <a:spcPct val="100000"/>
+              </a:lnSpc>
+              <a:spcBef>
+                <a:spcPts val="0"/>
+              </a:spcBef>
+              <a:spcAft>
+                <a:spcPts val="0"/>
+              </a:spcAft>
+              <a:buClrTx/>
+              <a:buSzTx/>
+              <a:buFontTx/>
+              <a:buNone/>
+              <a:tabLst/>
+              <a:defRPr/>
+            </a:pPr>
+            <a:r>
+              <a:rPr lang="en-US" dirty="0"/>
+              <a:t>Here is an example of the specification for HTTP. You can tell that it is “formal” because it includes a definitions section that goes so far as to clarify the usage of the term “MUST” or “SHOULD”, plus domain-specific terms like “connection” and “message”. The specification aims to have no ambiguities, whatsoever.</a:t>
+            </a:r>
+          </a:p>
+          <a:p>
+            <a:pPr marL="0" marR="0" lvl="0" indent="0" algn="l" defTabSz="914400" rtl="0" eaLnBrk="1" fontAlgn="auto" latinLnBrk="0" hangingPunct="1">
+              <a:lnSpc>
+                <a:spcPct val="100000"/>
+              </a:lnSpc>
+              <a:spcBef>
+                <a:spcPts val="0"/>
+              </a:spcBef>
+              <a:spcAft>
+                <a:spcPts val="0"/>
+              </a:spcAft>
+              <a:buClrTx/>
+              <a:buSzTx/>
+              <a:buFontTx/>
+              <a:buNone/>
+              <a:tabLst/>
+              <a:defRPr/>
+            </a:pPr>
             <a:endParaRPr lang="en-US" dirty="0"/>
           </a:p>
           <a:p>
-            <a:r>
-              <a:rPr lang="en-US" dirty="0"/>
-              <a:t>Not called “customer” stories, they are “user stories”. You might develop software for a self-driving car, and your customer is Tesla. But your users is Tesla’s customer. User stories force both you and your customer to focus on your user, who is presumably the one who wants to extract value from your software</a:t>
-            </a:r>
-          </a:p>
-          <a:p>
-            <a:endParaRPr lang="en-US" dirty="0"/>
-          </a:p>
-          <a:p>
-            <a:r>
-              <a:rPr lang="en-US" dirty="0"/>
-              <a:t>“Role” lets us distinguish between the different ways that our software might be used: Canvas is used by both instructors and students. However, there are even more roles, which have different capabilities: TAs can also view grades, but they can’t add new Tas. “Course observers” can see course content, but not grades, and are not enrolled in the class. There are quite a few different roles in Canvas, and maybe you can see how it would help to organize features in that way.</a:t>
-            </a:r>
-          </a:p>
-          <a:p>
-            <a:endParaRPr lang="en-US" dirty="0"/>
-          </a:p>
-          <a:p>
-            <a:r>
-              <a:rPr lang="en-US" dirty="0"/>
-              <a:t>What makes a good user story?</a:t>
+            <a:pPr marL="0" marR="0" lvl="0" indent="0" algn="l" defTabSz="914400" rtl="0" eaLnBrk="1" fontAlgn="auto" latinLnBrk="0" hangingPunct="1">
+              <a:lnSpc>
+                <a:spcPct val="100000"/>
+              </a:lnSpc>
+              <a:spcBef>
+                <a:spcPts val="0"/>
+              </a:spcBef>
+              <a:spcAft>
+                <a:spcPts val="0"/>
+              </a:spcAft>
+              <a:buClrTx/>
+              <a:buSzTx/>
+              <a:buFontTx/>
+              <a:buNone/>
+              <a:tabLst/>
+              <a:defRPr/>
+            </a:pPr>
+            <a:r>
+              <a:rPr lang="en-US" dirty="0"/>
+              <a:t>Ask class: When would such a specification be desirable?</a:t>
+            </a:r>
+          </a:p>
+          <a:p>
+            <a:r>
+              <a:rPr lang="en-US" dirty="0"/>
+              <a:t>Examples:</a:t>
+            </a:r>
+          </a:p>
+          <a:p>
+            <a:pPr marL="171450" indent="-171450">
+              <a:buFont typeface="Arial" panose="020B0604020202020204" pitchFamily="34" charset="0"/>
+              <a:buChar char="•"/>
+            </a:pPr>
+            <a:r>
+              <a:rPr lang="en-US" dirty="0"/>
+              <a:t>Well, obviously for HTTP (on the slide), and similarly for other protocols that require interoperability: want to make sure that a different team can implement a browser from a server from a caching proxy or content filter</a:t>
+            </a:r>
+          </a:p>
+          <a:p>
+            <a:pPr marL="171450" indent="-171450">
+              <a:buFont typeface="Arial" panose="020B0604020202020204" pitchFamily="34" charset="0"/>
+              <a:buChar char="•"/>
+            </a:pPr>
+            <a:r>
+              <a:rPr lang="en-US" dirty="0"/>
+              <a:t>Safety-critical systems (someone’s life is at risk; want to have formal review of formal specs)</a:t>
             </a:r>
           </a:p>
         </p:txBody>
@@ -4349,7 +4393,7 @@
     </p:spTree>
     <p:extLst>
       <p:ext uri="{BB962C8B-B14F-4D97-AF65-F5344CB8AC3E}">
-        <p14:creationId xmlns:p14="http://schemas.microsoft.com/office/powerpoint/2010/main" val="1855943089"/>
+        <p14:creationId xmlns:p14="http://schemas.microsoft.com/office/powerpoint/2010/main" val="2101111716"/>
       </p:ext>
     </p:extLst>
   </p:cSld>
@@ -4405,7 +4449,7 @@
           <a:p>
             <a:r>
               <a:rPr lang="en-US" dirty="0"/>
-              <a:t>Popular mnemonic for describing what makes a good user story</a:t>
+              <a:t>User stories are another approach for documenting requirements, which are structured to put the user first. A user story is a short simple description of ONE feature that can fit on a 3x5” card, written in the user’s language.</a:t>
             </a:r>
           </a:p>
           <a:p>
@@ -4414,24 +4458,7 @@
           <a:p>
             <a:r>
               <a:rPr lang="en-US" dirty="0"/>
-              <a:t>Independent – Stories should not be coupled between each other, except where obviously necessary. Want to make it so that a user can examine a story on its own</a:t>
-            </a:r>
-          </a:p>
-          <a:p>
-            <a:br>
-              <a:rPr lang="en-US" dirty="0"/>
-            </a:br>
-            <a:r>
-              <a:rPr lang="en-US" dirty="0"/>
-              <a:t>Negotiable – Best stories are result of a negotiation between a client and a developer – how do we come to some </a:t>
-            </a:r>
-            <a:r>
-              <a:rPr lang="en-US" dirty="0" err="1"/>
-              <a:t>utual</a:t>
-            </a:r>
-            <a:r>
-              <a:rPr lang="en-US" dirty="0"/>
-              <a:t> agreement about what we are going to build, and why? Goal is to develop what the customer needs</a:t>
+              <a:t>Why do we focus on the value? Because ultimately our goal with building software is presumably to deliver value – do something that helps some user accomplish some goal. That “something of value” is really what the requirement is. The customer probably doesn’t care to define every possible output for their system for every possible input – instead they just want to tell you what they want to have happen, in language that is as close to their own as possible.</a:t>
             </a:r>
           </a:p>
           <a:p>
@@ -4440,7 +4467,7 @@
           <a:p>
             <a:r>
               <a:rPr lang="en-US" dirty="0"/>
-              <a:t>Valuable – Each story should have some benefit that the user can recognize. Value might include value to your business, not just value to the user.</a:t>
+              <a:t>Not called “customer” stories, they are “user stories”. You might develop software for a self-driving car, and your customer is Tesla. But your users is Tesla’s customer. User stories force both you and your customer to focus on your user, who is presumably the one who wants to extract value from your software</a:t>
             </a:r>
           </a:p>
           <a:p>
@@ -4449,7 +4476,7 @@
           <a:p>
             <a:r>
               <a:rPr lang="en-US" dirty="0"/>
-              <a:t>Estimable – As we will see in a bit, being able to estimate how long it will take to implement a user story is key to determining a reasonable scope for your project</a:t>
+              <a:t>“Role” lets us distinguish between the different ways that our software might be used: Canvas is used by both instructors and students. However, there are even more roles, which have different capabilities: TAs can also view grades, but they can’t add new Tas. “Course observers” can see course content, but not grades, and are not enrolled in the class. There are quite a few different roles in Canvas, and maybe you can see how it would help to organize features in that way.</a:t>
             </a:r>
           </a:p>
           <a:p>
@@ -4458,7 +4485,7 @@
           <a:p>
             <a:r>
               <a:rPr lang="en-US" dirty="0"/>
-              <a:t>Small – A rule of thumb is to average 3-4 days of work per-story. Again, we’ll see this fit in with estimation.</a:t>
+              <a:t>User stories describe the capabilities that your software should provide. They do NOT directly describe the full behaviors of those capabilities. Under what circumstances should this capability be provided? What should happen if it can’t be provided? How do we expect users to actually interact with our system, and what results should we see?</a:t>
             </a:r>
           </a:p>
           <a:p>
@@ -4467,7 +4494,7 @@
           <a:p>
             <a:r>
               <a:rPr lang="en-US" dirty="0"/>
-              <a:t>Testable – There must be some way to judge completion: for the person implementing the software, and for the end-user. </a:t>
+              <a:t>Conditions of satisfaction are a vital part of user stories; they typically are longer than can fit on an index card – hence if you are not using some project management tracking software, but are writing stories on cards, you’ll typically put the conditions of satisfaction somewhere else, like in your project management tool</a:t>
             </a:r>
           </a:p>
           <a:p>
@@ -4476,44 +4503,16 @@
           <a:p>
             <a:r>
               <a:rPr lang="en-US" dirty="0"/>
-              <a:t>https://</a:t>
-            </a:r>
-            <a:r>
-              <a:rPr lang="en-US" dirty="0" err="1"/>
-              <a:t>agileforall.com</a:t>
-            </a:r>
-            <a:r>
-              <a:rPr lang="en-US" dirty="0"/>
-              <a:t>/new-to-agile-invest-in-good-user-stories/</a:t>
+              <a:t>Conditions of satisfaction are, effectively, test cases – or templates for test cases. These kinds of tests are sometimes called “acceptance tests” because they constitute the end-user accepting that your software does what they want. Cool! </a:t>
             </a:r>
           </a:p>
           <a:p>
             <a:endParaRPr lang="en-US" dirty="0"/>
           </a:p>
           <a:p>
-            <a:endParaRPr lang="en-US" dirty="0"/>
-          </a:p>
-          <a:p>
-            <a:pPr marL="0" marR="0" lvl="0" indent="0" algn="l" defTabSz="914400" rtl="0" eaLnBrk="1" fontAlgn="auto" latinLnBrk="0" hangingPunct="1">
-              <a:lnSpc>
-                <a:spcPct val="100000"/>
-              </a:lnSpc>
-              <a:spcBef>
-                <a:spcPts val="0"/>
-              </a:spcBef>
-              <a:spcAft>
-                <a:spcPts val="0"/>
-              </a:spcAft>
-              <a:buClrTx/>
-              <a:buSzTx/>
-              <a:buFontTx/>
-              <a:buNone/>
-              <a:tabLst/>
-              <a:defRPr/>
-            </a:pPr>
-            <a:r>
-              <a:rPr lang="en-US" dirty="0"/>
-              <a:t>… Let’s see an example and work through some of the tricky bits</a:t>
+            <a:r>
+              <a:rPr lang="en-US" dirty="0"/>
+              <a:t>What makes a good user story?</a:t>
             </a:r>
           </a:p>
         </p:txBody>
@@ -4544,7 +4543,7 @@
     </p:spTree>
     <p:extLst>
       <p:ext uri="{BB962C8B-B14F-4D97-AF65-F5344CB8AC3E}">
-        <p14:creationId xmlns:p14="http://schemas.microsoft.com/office/powerpoint/2010/main" val="1695675977"/>
+        <p14:creationId xmlns:p14="http://schemas.microsoft.com/office/powerpoint/2010/main" val="1855943089"/>
       </p:ext>
     </p:extLst>
   </p:cSld>
@@ -4598,7 +4597,118 @@
           <a:bodyPr/>
           <a:lstStyle/>
           <a:p>
+            <a:r>
+              <a:rPr lang="en-US" dirty="0"/>
+              <a:t>Popular mnemonic for describing what makes a good user story</a:t>
+            </a:r>
+          </a:p>
+          <a:p>
             <a:endParaRPr lang="en-US" dirty="0"/>
+          </a:p>
+          <a:p>
+            <a:r>
+              <a:rPr lang="en-US" dirty="0"/>
+              <a:t>Independent – Stories should not be coupled between each other, except where obviously necessary. Want to make it so that a user can examine a story on its own</a:t>
+            </a:r>
+          </a:p>
+          <a:p>
+            <a:br>
+              <a:rPr lang="en-US" dirty="0"/>
+            </a:br>
+            <a:r>
+              <a:rPr lang="en-US" dirty="0"/>
+              <a:t>Negotiable – Best stories are result of a negotiation between a client and a developer – how do we come to some </a:t>
+            </a:r>
+            <a:r>
+              <a:rPr lang="en-US" dirty="0" err="1"/>
+              <a:t>utual</a:t>
+            </a:r>
+            <a:r>
+              <a:rPr lang="en-US" dirty="0"/>
+              <a:t> agreement about what we are going to build, and why? Goal is to develop what the customer needs</a:t>
+            </a:r>
+          </a:p>
+          <a:p>
+            <a:endParaRPr lang="en-US" dirty="0"/>
+          </a:p>
+          <a:p>
+            <a:r>
+              <a:rPr lang="en-US" dirty="0"/>
+              <a:t>Valuable – Each story should have some benefit that the user can recognize. Value might include value to your business, not just value to the user.</a:t>
+            </a:r>
+          </a:p>
+          <a:p>
+            <a:endParaRPr lang="en-US" dirty="0"/>
+          </a:p>
+          <a:p>
+            <a:r>
+              <a:rPr lang="en-US" dirty="0"/>
+              <a:t>Estimable – As we will see in a bit, being able to estimate how long it will take to implement a user story is key to determining a reasonable scope for your project</a:t>
+            </a:r>
+          </a:p>
+          <a:p>
+            <a:endParaRPr lang="en-US" dirty="0"/>
+          </a:p>
+          <a:p>
+            <a:r>
+              <a:rPr lang="en-US" dirty="0"/>
+              <a:t>Small – A rule of thumb is to average 3-4 days of work per-story. Again, we’ll see this fit in with estimation.</a:t>
+            </a:r>
+          </a:p>
+          <a:p>
+            <a:endParaRPr lang="en-US" dirty="0"/>
+          </a:p>
+          <a:p>
+            <a:r>
+              <a:rPr lang="en-US" dirty="0"/>
+              <a:t>Testable – There must be some way to judge completion: for the person implementing the software, and for the end-user. </a:t>
+            </a:r>
+          </a:p>
+          <a:p>
+            <a:endParaRPr lang="en-US" dirty="0"/>
+          </a:p>
+          <a:p>
+            <a:r>
+              <a:rPr lang="en-US" dirty="0"/>
+              <a:t>https://</a:t>
+            </a:r>
+            <a:r>
+              <a:rPr lang="en-US" dirty="0" err="1"/>
+              <a:t>agileforall.com</a:t>
+            </a:r>
+            <a:r>
+              <a:rPr lang="en-US" dirty="0"/>
+              <a:t>/new-to-agile-invest-in-good-user-stories/</a:t>
+            </a:r>
+          </a:p>
+          <a:p>
+            <a:endParaRPr lang="en-US" dirty="0"/>
+          </a:p>
+          <a:p>
+            <a:endParaRPr lang="en-US" dirty="0"/>
+          </a:p>
+          <a:p>
+            <a:pPr marL="0" marR="0" lvl="0" indent="0" algn="l" defTabSz="914400" rtl="0" eaLnBrk="1" fontAlgn="auto" latinLnBrk="0" hangingPunct="1">
+              <a:lnSpc>
+                <a:spcPct val="100000"/>
+              </a:lnSpc>
+              <a:spcBef>
+                <a:spcPts val="0"/>
+              </a:spcBef>
+              <a:spcAft>
+                <a:spcPts val="0"/>
+              </a:spcAft>
+              <a:buClrTx/>
+              <a:buSzTx/>
+              <a:buFontTx/>
+              <a:buNone/>
+              <a:tabLst/>
+              <a:defRPr/>
+            </a:pPr>
+            <a:r>
+              <a:rPr lang="en-US" dirty="0"/>
+              <a:t>… Let’s see an example and work through some of the tricky bits</a:t>
+            </a:r>
           </a:p>
         </p:txBody>
       </p:sp>
@@ -4628,7 +4738,7 @@
     </p:spTree>
     <p:extLst>
       <p:ext uri="{BB962C8B-B14F-4D97-AF65-F5344CB8AC3E}">
-        <p14:creationId xmlns:p14="http://schemas.microsoft.com/office/powerpoint/2010/main" val="917151726"/>
+        <p14:creationId xmlns:p14="http://schemas.microsoft.com/office/powerpoint/2010/main" val="1695675977"/>
       </p:ext>
     </p:extLst>
   </p:cSld>
@@ -4682,10 +4792,7 @@
           <a:bodyPr/>
           <a:lstStyle/>
           <a:p>
-            <a:r>
-              <a:rPr lang="en-US" dirty="0"/>
-              <a:t>Discuss these potential special cases, can do brainstorming to get some ideas going about what conditions of satisfaction are for backups</a:t>
-            </a:r>
+            <a:endParaRPr lang="en-US" dirty="0"/>
           </a:p>
         </p:txBody>
       </p:sp>
@@ -4715,7 +4822,7 @@
     </p:spTree>
     <p:extLst>
       <p:ext uri="{BB962C8B-B14F-4D97-AF65-F5344CB8AC3E}">
-        <p14:creationId xmlns:p14="http://schemas.microsoft.com/office/powerpoint/2010/main" val="1671807375"/>
+        <p14:creationId xmlns:p14="http://schemas.microsoft.com/office/powerpoint/2010/main" val="917151726"/>
       </p:ext>
     </p:extLst>
   </p:cSld>
@@ -4771,22 +4878,7 @@
           <a:p>
             <a:r>
               <a:rPr lang="en-US" dirty="0"/>
-              <a:t>Conditions of satisfaction are, effectively, test cases – or templates for test cases. These kinds of tests are sometimes called “acceptance tests” because they constitute the end-user accepting that your software does what they want. Cool! </a:t>
-            </a:r>
-          </a:p>
-          <a:p>
-            <a:r>
-              <a:rPr lang="en-US" dirty="0"/>
-              <a:t>They are usually much more lengthy than user stories, and are stored elsewhere (particularly if you are using 3x5” cards!), maybe in a project management tool</a:t>
-            </a:r>
-          </a:p>
-          <a:p>
-            <a:endParaRPr lang="en-US" dirty="0"/>
-          </a:p>
-          <a:p>
-            <a:r>
-              <a:rPr lang="en-US" dirty="0"/>
-              <a:t>Discuss conditions of satisfaction. Do students think these are clear? Will we end up with a system that we are satisfied with?</a:t>
+              <a:t>Discuss these potential special cases, can do brainstorming to get some ideas going about what conditions of satisfaction are for backups</a:t>
             </a:r>
           </a:p>
         </p:txBody>
@@ -4817,7 +4909,7 @@
     </p:spTree>
     <p:extLst>
       <p:ext uri="{BB962C8B-B14F-4D97-AF65-F5344CB8AC3E}">
-        <p14:creationId xmlns:p14="http://schemas.microsoft.com/office/powerpoint/2010/main" val="3053346908"/>
+        <p14:creationId xmlns:p14="http://schemas.microsoft.com/office/powerpoint/2010/main" val="1671807375"/>
       </p:ext>
     </p:extLst>
   </p:cSld>
@@ -4871,26 +4963,12 @@
           <a:bodyPr/>
           <a:lstStyle/>
           <a:p>
-            <a:pPr marL="0" marR="0" lvl="0" indent="0" algn="l" defTabSz="914400" rtl="0" eaLnBrk="1" fontAlgn="auto" latinLnBrk="0" hangingPunct="1">
-              <a:lnSpc>
-                <a:spcPct val="100000"/>
-              </a:lnSpc>
-              <a:spcBef>
-                <a:spcPts val="0"/>
-              </a:spcBef>
-              <a:spcAft>
-                <a:spcPts val="0"/>
-              </a:spcAft>
-              <a:buClrTx/>
-              <a:buSzTx/>
-              <a:buFontTx/>
-              <a:buNone/>
-              <a:tabLst/>
-              <a:defRPr/>
-            </a:pPr>
-            <a:r>
-              <a:rPr lang="en-US" dirty="0"/>
-              <a:t>“Can I retrieve my files, and if so, how long will it take?” is probably another use case</a:t>
+            <a:endParaRPr lang="en-US" dirty="0"/>
+          </a:p>
+          <a:p>
+            <a:r>
+              <a:rPr lang="en-US" dirty="0"/>
+              <a:t>Discuss conditions of satisfaction. Do students think these are clear? Will we end up with a system that we are satisfied with?</a:t>
             </a:r>
           </a:p>
         </p:txBody>
@@ -4921,7 +4999,7 @@
     </p:spTree>
     <p:extLst>
       <p:ext uri="{BB962C8B-B14F-4D97-AF65-F5344CB8AC3E}">
-        <p14:creationId xmlns:p14="http://schemas.microsoft.com/office/powerpoint/2010/main" val="3623387796"/>
+        <p14:creationId xmlns:p14="http://schemas.microsoft.com/office/powerpoint/2010/main" val="3053346908"/>
       </p:ext>
     </p:extLst>
   </p:cSld>
@@ -4994,111 +5072,8 @@
             </a:pPr>
             <a:r>
               <a:rPr lang="en-US" dirty="0"/>
-              <a:t>Non-functional requirements capture the </a:t>
-            </a:r>
-            <a:r>
-              <a:rPr lang="en-US" i="1" dirty="0"/>
-              <a:t>quality goals</a:t>
-            </a:r>
-            <a:r>
-              <a:rPr lang="en-US" i="0" dirty="0"/>
-              <a:t> of a system. As we saw in this backups example, the product that you end up building might satisfy the functional requirements, while resulting in something that is totally useless as a backup system, because you didn’t realize that backed up files shouldn’t be listed publicly on the internet – </a:t>
-            </a:r>
-            <a:r>
-              <a:rPr lang="en-US" i="0" dirty="0" err="1"/>
-              <a:t>oops,I</a:t>
-            </a:r>
-            <a:r>
-              <a:rPr lang="en-US" i="0" dirty="0"/>
-              <a:t> guess that should have been documented in the requirements.</a:t>
-            </a:r>
-          </a:p>
-          <a:p>
-            <a:pPr marL="0" marR="0" lvl="0" indent="0" algn="l" defTabSz="914400" rtl="0" eaLnBrk="1" fontAlgn="auto" latinLnBrk="0" hangingPunct="1">
-              <a:lnSpc>
-                <a:spcPct val="100000"/>
-              </a:lnSpc>
-              <a:spcBef>
-                <a:spcPts val="0"/>
-              </a:spcBef>
-              <a:spcAft>
-                <a:spcPts val="0"/>
-              </a:spcAft>
-              <a:buClrTx/>
-              <a:buSzTx/>
-              <a:buFontTx/>
-              <a:buNone/>
-              <a:tabLst/>
-              <a:defRPr/>
-            </a:pPr>
-            <a:endParaRPr lang="en-US" i="0" dirty="0"/>
-          </a:p>
-          <a:p>
-            <a:pPr marL="0" marR="0" lvl="0" indent="0" algn="l" defTabSz="914400" rtl="0" eaLnBrk="1" fontAlgn="auto" latinLnBrk="0" hangingPunct="1">
-              <a:lnSpc>
-                <a:spcPct val="100000"/>
-              </a:lnSpc>
-              <a:spcBef>
-                <a:spcPts val="0"/>
-              </a:spcBef>
-              <a:spcAft>
-                <a:spcPts val="0"/>
-              </a:spcAft>
-              <a:buClrTx/>
-              <a:buSzTx/>
-              <a:buFontTx/>
-              <a:buNone/>
-              <a:tabLst/>
-              <a:defRPr/>
-            </a:pPr>
-            <a:r>
-              <a:rPr lang="en-US" i="0" dirty="0"/>
-              <a:t>Here is a partial list of some quality goals, or non-functional requirements that you might need to consider on a project. Note that this is only a partial list, but we included some examples to demonstrate how precise you can be.</a:t>
-            </a:r>
-          </a:p>
-          <a:p>
-            <a:pPr marL="0" marR="0" lvl="0" indent="0" algn="l" defTabSz="914400" rtl="0" eaLnBrk="1" fontAlgn="auto" latinLnBrk="0" hangingPunct="1">
-              <a:lnSpc>
-                <a:spcPct val="100000"/>
-              </a:lnSpc>
-              <a:spcBef>
-                <a:spcPts val="0"/>
-              </a:spcBef>
-              <a:spcAft>
-                <a:spcPts val="0"/>
-              </a:spcAft>
-              <a:buClrTx/>
-              <a:buSzTx/>
-              <a:buFontTx/>
-              <a:buNone/>
-              <a:tabLst/>
-              <a:defRPr/>
-            </a:pPr>
-            <a:endParaRPr lang="en-US" i="0" dirty="0"/>
-          </a:p>
-          <a:p>
-            <a:pPr marL="0" marR="0" lvl="0" indent="0" algn="l" defTabSz="914400" rtl="0" eaLnBrk="1" fontAlgn="auto" latinLnBrk="0" hangingPunct="1">
-              <a:lnSpc>
-                <a:spcPct val="100000"/>
-              </a:lnSpc>
-              <a:spcBef>
-                <a:spcPts val="0"/>
-              </a:spcBef>
-              <a:spcAft>
-                <a:spcPts val="0"/>
-              </a:spcAft>
-              <a:buClrTx/>
-              <a:buSzTx/>
-              <a:buFontTx/>
-              <a:buNone/>
-              <a:tabLst/>
-              <a:defRPr/>
-            </a:pPr>
-            <a:r>
-              <a:rPr lang="en-US" i="0" dirty="0"/>
-              <a:t>For example, one high-level goal is to say “I want performance”. But what does performance mean? You probably mean to say that you expect that the system has some particular capacity (in terms of simultaneous users), who can simultaneously have their requests satisfied within some response time. That’s still not the whole picture though, because you didn’t specify the efficiency of your system: what hardware resources does it use to achieve that performance?</a:t>
-            </a:r>
-            <a:endParaRPr lang="en-US" dirty="0"/>
+              <a:t>“Can I retrieve my files, and if so, how long will it take?” is probably another use case</a:t>
+            </a:r>
           </a:p>
         </p:txBody>
       </p:sp>
@@ -5128,7 +5103,7 @@
     </p:spTree>
     <p:extLst>
       <p:ext uri="{BB962C8B-B14F-4D97-AF65-F5344CB8AC3E}">
-        <p14:creationId xmlns:p14="http://schemas.microsoft.com/office/powerpoint/2010/main" val="1539519105"/>
+        <p14:creationId xmlns:p14="http://schemas.microsoft.com/office/powerpoint/2010/main" val="3623387796"/>
       </p:ext>
     </p:extLst>
   </p:cSld>
@@ -5199,53 +5174,7 @@
               <a:tabLst/>
               <a:defRPr/>
             </a:pPr>
-            <a:r>
-              <a:rPr lang="en-US" dirty="0"/>
-              <a:t>Non-functional requirements might also impact the static existence of the system, or its evolution.</a:t>
-            </a:r>
-          </a:p>
-          <a:p>
-            <a:pPr marL="0" marR="0" lvl="0" indent="0" algn="l" defTabSz="914400" rtl="0" eaLnBrk="1" fontAlgn="auto" latinLnBrk="0" hangingPunct="1">
-              <a:lnSpc>
-                <a:spcPct val="100000"/>
-              </a:lnSpc>
-              <a:spcBef>
-                <a:spcPts val="0"/>
-              </a:spcBef>
-              <a:spcAft>
-                <a:spcPts val="0"/>
-              </a:spcAft>
-              <a:buClrTx/>
-              <a:buSzTx/>
-              <a:buFontTx/>
-              <a:buNone/>
-              <a:tabLst/>
-              <a:defRPr/>
-            </a:pPr>
             <a:endParaRPr lang="en-US" dirty="0"/>
-          </a:p>
-          <a:p>
-            <a:pPr marL="0" marR="0" lvl="0" indent="0" algn="l" defTabSz="914400" rtl="0" eaLnBrk="1" fontAlgn="auto" latinLnBrk="0" hangingPunct="1">
-              <a:lnSpc>
-                <a:spcPct val="100000"/>
-              </a:lnSpc>
-              <a:spcBef>
-                <a:spcPts val="0"/>
-              </a:spcBef>
-              <a:spcAft>
-                <a:spcPts val="0"/>
-              </a:spcAft>
-              <a:buClrTx/>
-              <a:buSzTx/>
-              <a:buFontTx/>
-              <a:buNone/>
-              <a:tabLst/>
-              <a:defRPr/>
-            </a:pPr>
-            <a:r>
-              <a:rPr lang="en-US" dirty="0"/>
-              <a:t>For example, if a customer intends for your software to be particularly long-lasting, and to be able to be extended – this needs to be said. Similarly, if there are specific testing requirements that your customer needs to comply with, there may be testability requirements, that define the effort needed to test the behaviors of that system.</a:t>
-            </a:r>
           </a:p>
         </p:txBody>
       </p:sp>
@@ -5275,7 +5204,7 @@
     </p:spTree>
     <p:extLst>
       <p:ext uri="{BB962C8B-B14F-4D97-AF65-F5344CB8AC3E}">
-        <p14:creationId xmlns:p14="http://schemas.microsoft.com/office/powerpoint/2010/main" val="3523526305"/>
+        <p14:creationId xmlns:p14="http://schemas.microsoft.com/office/powerpoint/2010/main" val="346195192"/>
       </p:ext>
     </p:extLst>
   </p:cSld>
@@ -5329,24 +5258,10 @@
           <a:bodyPr/>
           <a:lstStyle/>
           <a:p>
-            <a:pPr marL="0" marR="0" lvl="0" indent="0" algn="l" defTabSz="914400" rtl="0" eaLnBrk="1" fontAlgn="auto" latinLnBrk="0" hangingPunct="1">
-              <a:lnSpc>
-                <a:spcPct val="100000"/>
-              </a:lnSpc>
-              <a:spcBef>
-                <a:spcPts val="0"/>
-              </a:spcBef>
-              <a:spcAft>
-                <a:spcPts val="0"/>
-              </a:spcAft>
-              <a:buClrTx/>
-              <a:buSzTx/>
-              <a:buFontTx/>
-              <a:buNone/>
-              <a:tabLst/>
-              <a:defRPr/>
-            </a:pPr>
-            <a:endParaRPr lang="en-US" dirty="0"/>
+            <a:r>
+              <a:rPr lang="en-US" dirty="0"/>
+              <a:t>&lt;read slide&gt;</a:t>
+            </a:r>
           </a:p>
         </p:txBody>
       </p:sp>
@@ -5376,7 +5291,7 @@
     </p:spTree>
     <p:extLst>
       <p:ext uri="{BB962C8B-B14F-4D97-AF65-F5344CB8AC3E}">
-        <p14:creationId xmlns:p14="http://schemas.microsoft.com/office/powerpoint/2010/main" val="346195192"/>
+        <p14:creationId xmlns:p14="http://schemas.microsoft.com/office/powerpoint/2010/main" val="1604120877"/>
       </p:ext>
     </p:extLst>
   </p:cSld>
@@ -5723,7 +5638,7 @@
           <a:p>
             <a:r>
               <a:rPr lang="en-US" dirty="0"/>
-              <a:t>It may not be surprising that this meme dates back to at least the 1970’s, and long before the internet, was photocopied and hung up on the wall in many offices, particularly at software companies. These are not new problems: understanding what the customer wants the software to be, and then ensuring that we implement something that solves that problem is not easy. We’ll provide some historical context of how software was built between the 1960’s and today. </a:t>
+              <a:t>Consider right now an example developing of a virtual meeting platform. With the start of the COVID-19 pandemic, and shift to virtual meetings, there has been an enormous demand for software to help substitute for physical events. But, even today, two years into this, many platforms still don’t provide the experience that users want: how do you replace some physical interactions with a software product? These kind of challenges come up all of the time in software projects.</a:t>
             </a:r>
           </a:p>
           <a:p>
@@ -5732,7 +5647,104 @@
           <a:p>
             <a:r>
               <a:rPr lang="en-US" dirty="0"/>
-              <a:t>Throughout this historical journey, we will see that each approach had proponents who insisted that as long as some particular process was followed, success was surely guaranteed. Using the power of hindsight, we’ll try to tease apart some best practices that work better than others, and more importantly, under what contexts you might want to try each approach</a:t>
+              <a:t>Sometimes, clients want to bring software in to solve some problem that is currently not being addressed, but don’t know exactly how to solve it. In other times, new software is brought in as a technology to improve an existing process. There is a way that things are done, and your software is going to help that get done better. In those situations, the client may simply not know what will work best for them. </a:t>
+            </a:r>
+          </a:p>
+          <a:p>
+            <a:endParaRPr lang="en-US" dirty="0"/>
+          </a:p>
+          <a:p>
+            <a:r>
+              <a:rPr lang="en-US" dirty="0"/>
+              <a:t>Software engineering aims to provide answers, or at least a framework for answers to these questions</a:t>
+            </a:r>
+          </a:p>
+          <a:p>
+            <a:endParaRPr lang="en-US" dirty="0"/>
+          </a:p>
+          <a:p>
+            <a:r>
+              <a:rPr lang="en-US" dirty="0"/>
+              <a:t>Examples of problems of understanding corresponding to the bullets:</a:t>
+            </a:r>
+          </a:p>
+          <a:p>
+            <a:pPr marL="171450" indent="-171450">
+              <a:buFont typeface="Arial" panose="020B0604020202020204" pitchFamily="34" charset="0"/>
+              <a:buChar char="•"/>
+            </a:pPr>
+            <a:r>
+              <a:rPr lang="en-US" dirty="0"/>
+              <a:t>What they want? -&gt; Simply don’t know what is possible, won’t know it until they see it, often know what the problem is that they want the software to solve, but not the solution. Coming up with the solution is a design problem. Good to have a buddy who is a user experience designer.</a:t>
+            </a:r>
+          </a:p>
+          <a:p>
+            <a:pPr marL="171450" indent="-171450">
+              <a:buFont typeface="Arial" panose="020B0604020202020204" pitchFamily="34" charset="0"/>
+              <a:buChar char="•"/>
+            </a:pPr>
+            <a:r>
+              <a:rPr lang="en-US" dirty="0"/>
+              <a:t>What we don’t know? -&gt; Most software is not “general purpose”, but exists within some domain.</a:t>
+            </a:r>
+          </a:p>
+          <a:p>
+            <a:pPr marL="171450" indent="-171450">
+              <a:buFont typeface="Arial" panose="020B0604020202020204" pitchFamily="34" charset="0"/>
+              <a:buChar char="•"/>
+            </a:pPr>
+            <a:r>
+              <a:rPr lang="en-US" dirty="0"/>
+              <a:t>Who are our users? -&gt; Maybe most common in startups, where you have a client (moneybags investors) who are guessing who your users will be and what they want</a:t>
+            </a:r>
+          </a:p>
+          <a:p>
+            <a:pPr marL="171450" indent="-171450">
+              <a:buFont typeface="Arial" panose="020B0604020202020204" pitchFamily="34" charset="0"/>
+              <a:buChar char="•"/>
+            </a:pPr>
+            <a:endParaRPr lang="en-US" dirty="0"/>
+          </a:p>
+          <a:p>
+            <a:pPr marL="171450" indent="-171450">
+              <a:buFont typeface="Arial" panose="020B0604020202020204" pitchFamily="34" charset="0"/>
+              <a:buChar char="•"/>
+            </a:pPr>
+            <a:r>
+              <a:rPr lang="en-US" dirty="0"/>
+              <a:t>Scope - What are we building? -&gt; How to agree with client on a statement of work that is feasible given constraints, how to make sure that we stay on track?</a:t>
+            </a:r>
+          </a:p>
+          <a:p>
+            <a:pPr marL="171450" indent="-171450">
+              <a:buFont typeface="Arial" panose="020B0604020202020204" pitchFamily="34" charset="0"/>
+              <a:buChar char="•"/>
+            </a:pPr>
+            <a:r>
+              <a:rPr lang="en-US" dirty="0"/>
+              <a:t>Scope – quality attributes -&gt; How to specify things like performance, usability, maintainability, security, </a:t>
+            </a:r>
+            <a:r>
+              <a:rPr lang="en-US" dirty="0" err="1"/>
+              <a:t>etc</a:t>
+            </a:r>
+            <a:endParaRPr lang="en-US" dirty="0"/>
+          </a:p>
+          <a:p>
+            <a:pPr marL="171450" indent="-171450">
+              <a:buFont typeface="Arial" panose="020B0604020202020204" pitchFamily="34" charset="0"/>
+              <a:buChar char="•"/>
+            </a:pPr>
+            <a:endParaRPr lang="en-US" dirty="0"/>
+          </a:p>
+          <a:p>
+            <a:pPr marL="171450" indent="-171450">
+              <a:buFont typeface="Arial" panose="020B0604020202020204" pitchFamily="34" charset="0"/>
+              <a:buChar char="•"/>
+            </a:pPr>
+            <a:r>
+              <a:rPr lang="en-US" dirty="0"/>
+              <a:t>Volatility -&gt; Long projects subject to changes in world around them</a:t>
             </a:r>
           </a:p>
         </p:txBody>
@@ -5763,7 +5775,7 @@
     </p:spTree>
     <p:extLst>
       <p:ext uri="{BB962C8B-B14F-4D97-AF65-F5344CB8AC3E}">
-        <p14:creationId xmlns:p14="http://schemas.microsoft.com/office/powerpoint/2010/main" val="1160973628"/>
+        <p14:creationId xmlns:p14="http://schemas.microsoft.com/office/powerpoint/2010/main" val="345792990"/>
       </p:ext>
     </p:extLst>
   </p:cSld>
@@ -5819,7 +5831,7 @@
           <a:p>
             <a:r>
               <a:rPr lang="en-US" dirty="0"/>
-              <a:t>Consider right now an example developing of a virtual meeting platform. With the start of the COVID-19 pandemic, and shift to virtual meetings, there has been an enormous demand for software to help substitute for physical events. But, even today, two years into this, many platforms still don’t provide the experience that users want: how do you replace some physical interactions with a software product? These kind of challenges come up all of the time in software projects.</a:t>
+              <a:t>Step one to getting a better understanding of our requirements is to decide how to solicit them from our customers. We have two options, this is the first.</a:t>
             </a:r>
           </a:p>
           <a:p>
@@ -5828,7 +5840,7 @@
           <a:p>
             <a:r>
               <a:rPr lang="en-US" dirty="0"/>
-              <a:t>Sometimes, clients want to bring software in to solve some problem that is currently not being addressed, but don’t know exactly how to solve it. In other times, new software is brought in as a technology to improve an existing process. There is a way that things are done, and your software is going to help that get done better. In those situations, the client may simply not know what will work best for them. </a:t>
+              <a:t>What is good about asking clients what they want, what is bad?</a:t>
             </a:r>
           </a:p>
           <a:p>
@@ -5837,16 +5849,7 @@
           <a:p>
             <a:r>
               <a:rPr lang="en-US" dirty="0"/>
-              <a:t>Software engineering aims to provide answers, or at least a framework for answers to these questions</a:t>
-            </a:r>
-          </a:p>
-          <a:p>
-            <a:endParaRPr lang="en-US" dirty="0"/>
-          </a:p>
-          <a:p>
-            <a:r>
-              <a:rPr lang="en-US" dirty="0"/>
-              <a:t>Examples of problems of understanding corresponding to the bullets:</a:t>
+              <a:t>Good:</a:t>
             </a:r>
           </a:p>
           <a:p>
@@ -5856,8 +5859,12 @@
             </a:pPr>
             <a:r>
               <a:rPr lang="en-US" dirty="0"/>
-              <a:t>What they want? -&gt; Simply don’t know what is possible, won’t know it until they see it, often know what the problem is that they want the software to solve, but not the solution. Coming up with the solution is a design problem. Good to have a buddy who is a user experience designer.</a:t>
-            </a:r>
+              <a:t>If client is clear about what they want, you are clear in understanding it, then client can’t complain when they are unhappy with what meets their spec.</a:t>
+            </a:r>
+            <a:br>
+              <a:rPr lang="en-US" dirty="0"/>
+            </a:br>
+            <a:endParaRPr lang="en-US" dirty="0"/>
           </a:p>
           <a:p>
             <a:pPr marL="171450" indent="-171450">
@@ -5866,7 +5873,7 @@
             </a:pPr>
             <a:r>
               <a:rPr lang="en-US" dirty="0"/>
-              <a:t>What we don’t know? -&gt; Most software is not “general purpose”, but exists within some domain.</a:t>
+              <a:t>Bad:</a:t>
             </a:r>
           </a:p>
           <a:p>
@@ -5876,8 +5883,89 @@
             </a:pPr>
             <a:r>
               <a:rPr lang="en-US" dirty="0"/>
-              <a:t>Who are our users? -&gt; Maybe most common in startups, where you have a client (moneybags investors) who are guessing who your users will be and what they want</a:t>
-            </a:r>
+              <a:t>Client can still be unhappy with you</a:t>
+            </a:r>
+          </a:p>
+          <a:p>
+            <a:r>
+              <a:rPr lang="en-US" dirty="0"/>
+              <a:t>Likely to have some ambiguities in the requirements provided, consider domain-specific knowledge.</a:t>
+            </a:r>
+            <a:r>
+              <a:rPr lang="en-US" sz="1200" b="0" kern="1200" dirty="0">
+                <a:solidFill>
+                  <a:schemeClr val="tx1"/>
+                </a:solidFill>
+                <a:effectLst/>
+                <a:latin typeface="+mn-lt"/>
+                <a:ea typeface="+mn-ea"/>
+                <a:cs typeface="+mn-cs"/>
+              </a:rPr>
+              <a:t> Assumptions or domain knowledge: existing behavior that is unchanged by the proposed system. </a:t>
+            </a:r>
+            <a:endParaRPr lang="en-US" dirty="0">
+              <a:effectLst/>
+            </a:endParaRPr>
+          </a:p>
+          <a:p>
+            <a:pPr lvl="1"/>
+            <a:r>
+              <a:rPr lang="en-US" sz="1000" kern="1200" dirty="0">
+                <a:solidFill>
+                  <a:schemeClr val="tx1"/>
+                </a:solidFill>
+                <a:effectLst/>
+                <a:latin typeface="+mn-lt"/>
+                <a:ea typeface="+mn-ea"/>
+                <a:cs typeface="+mn-cs"/>
+              </a:rPr>
+              <a:t>○  </a:t>
+            </a:r>
+            <a:r>
+              <a:rPr lang="en-US" sz="1200" b="0" kern="1200" dirty="0">
+                <a:solidFill>
+                  <a:schemeClr val="tx1"/>
+                </a:solidFill>
+                <a:effectLst/>
+                <a:latin typeface="+mn-lt"/>
+                <a:ea typeface="+mn-ea"/>
+                <a:cs typeface="+mn-cs"/>
+              </a:rPr>
+              <a:t>Conditions under which the system is guaranteed to operate correctly. </a:t>
+            </a:r>
+            <a:endParaRPr lang="en-US" dirty="0">
+              <a:effectLst/>
+            </a:endParaRPr>
+          </a:p>
+          <a:p>
+            <a:pPr lvl="1"/>
+            <a:r>
+              <a:rPr lang="en-US" sz="1000" kern="1200" dirty="0">
+                <a:solidFill>
+                  <a:schemeClr val="tx1"/>
+                </a:solidFill>
+                <a:effectLst/>
+                <a:latin typeface="+mn-lt"/>
+                <a:ea typeface="+mn-ea"/>
+                <a:cs typeface="+mn-cs"/>
+              </a:rPr>
+              <a:t>○  </a:t>
+            </a:r>
+            <a:r>
+              <a:rPr lang="en-US" sz="1200" b="0" kern="1200" dirty="0">
+                <a:solidFill>
+                  <a:schemeClr val="tx1"/>
+                </a:solidFill>
+                <a:effectLst/>
+                <a:latin typeface="+mn-lt"/>
+                <a:ea typeface="+mn-ea"/>
+                <a:cs typeface="+mn-cs"/>
+              </a:rPr>
+              <a:t>How the environment will behave in response to the system’s outputs. </a:t>
+            </a:r>
+            <a:endParaRPr lang="en-US" dirty="0">
+              <a:effectLst/>
+            </a:endParaRPr>
           </a:p>
           <a:p>
             <a:pPr marL="171450" indent="-171450">
@@ -5886,48 +5974,6 @@
             </a:pPr>
             <a:endParaRPr lang="en-US" dirty="0"/>
           </a:p>
-          <a:p>
-            <a:pPr marL="171450" indent="-171450">
-              <a:buFont typeface="Arial" panose="020B0604020202020204" pitchFamily="34" charset="0"/>
-              <a:buChar char="•"/>
-            </a:pPr>
-            <a:r>
-              <a:rPr lang="en-US" dirty="0"/>
-              <a:t>Scope - What are we building? -&gt; How to agree with client on a statement of work that is feasible given constraints, how to make sure that we stay on track?</a:t>
-            </a:r>
-          </a:p>
-          <a:p>
-            <a:pPr marL="171450" indent="-171450">
-              <a:buFont typeface="Arial" panose="020B0604020202020204" pitchFamily="34" charset="0"/>
-              <a:buChar char="•"/>
-            </a:pPr>
-            <a:r>
-              <a:rPr lang="en-US" dirty="0"/>
-              <a:t>Scope – quality attributes -&gt; How to specify things like performance, usability, maintainability, security, </a:t>
-            </a:r>
-            <a:r>
-              <a:rPr lang="en-US" dirty="0" err="1"/>
-              <a:t>etc</a:t>
-            </a:r>
-            <a:endParaRPr lang="en-US" dirty="0"/>
-          </a:p>
-          <a:p>
-            <a:pPr marL="171450" indent="-171450">
-              <a:buFont typeface="Arial" panose="020B0604020202020204" pitchFamily="34" charset="0"/>
-              <a:buChar char="•"/>
-            </a:pPr>
-            <a:endParaRPr lang="en-US" dirty="0"/>
-          </a:p>
-          <a:p>
-            <a:pPr marL="171450" indent="-171450">
-              <a:buFont typeface="Arial" panose="020B0604020202020204" pitchFamily="34" charset="0"/>
-              <a:buChar char="•"/>
-            </a:pPr>
-            <a:r>
-              <a:rPr lang="en-US" dirty="0"/>
-              <a:t>Volatility -&gt; Long projects subject to changes in world around them</a:t>
-            </a:r>
-          </a:p>
         </p:txBody>
       </p:sp>
       <p:sp>
@@ -5956,7 +6002,7 @@
     </p:spTree>
     <p:extLst>
       <p:ext uri="{BB962C8B-B14F-4D97-AF65-F5344CB8AC3E}">
-        <p14:creationId xmlns:p14="http://schemas.microsoft.com/office/powerpoint/2010/main" val="345792990"/>
+        <p14:creationId xmlns:p14="http://schemas.microsoft.com/office/powerpoint/2010/main" val="1885342880"/>
       </p:ext>
     </p:extLst>
   </p:cSld>
@@ -6011,8 +6057,12 @@
           <a:lstStyle/>
           <a:p>
             <a:r>
-              <a:rPr lang="en-US" dirty="0"/>
-              <a:t>Step one to getting a better understanding of our requirements is to decide how to solicit them from our customers. We have two options, this is the first.</a:t>
+              <a:rPr lang="en-US" dirty="0" err="1"/>
+              <a:t>Needfinding</a:t>
+            </a:r>
+            <a:r>
+              <a:rPr lang="en-US" dirty="0"/>
+              <a:t> broadly describes a form of design research where we use qualitative methods to understand what product is needed. Product design research is quite literally the topic of another class, so we won’t go too far into depth here, other than to be sure that you are aware of its existence and its benefits</a:t>
             </a:r>
           </a:p>
           <a:p>
@@ -6021,59 +6071,29 @@
           <a:p>
             <a:r>
               <a:rPr lang="en-US" dirty="0"/>
-              <a:t>What is good about asking clients what they want, what is bad?</a:t>
-            </a:r>
-          </a:p>
-          <a:p>
-            <a:endParaRPr lang="en-US" dirty="0"/>
-          </a:p>
-          <a:p>
-            <a:r>
-              <a:rPr lang="en-US" dirty="0"/>
-              <a:t>Good:</a:t>
-            </a:r>
-          </a:p>
-          <a:p>
-            <a:pPr marL="171450" indent="-171450">
-              <a:buFont typeface="Arial" panose="020B0604020202020204" pitchFamily="34" charset="0"/>
-              <a:buChar char="•"/>
+              <a:t>Kinds of qualitative data that you can gather:</a:t>
+            </a:r>
+          </a:p>
+          <a:p>
+            <a:pPr marL="0" marR="0" lvl="0" indent="0" algn="l" defTabSz="914400" rtl="0" eaLnBrk="1" fontAlgn="auto" latinLnBrk="0" hangingPunct="1">
+              <a:lnSpc>
+                <a:spcPct val="100000"/>
+              </a:lnSpc>
+              <a:spcBef>
+                <a:spcPts val="0"/>
+              </a:spcBef>
+              <a:spcAft>
+                <a:spcPts val="0"/>
+              </a:spcAft>
+              <a:buClrTx/>
+              <a:buSzTx/>
+              <a:buFontTx/>
+              <a:buNone/>
+              <a:tabLst/>
+              <a:defRPr/>
             </a:pPr>
             <a:r>
-              <a:rPr lang="en-US" dirty="0"/>
-              <a:t>If client is clear about what they want, you are clear in understanding it, then client can’t complain when they are unhappy with what meets their spec.</a:t>
-            </a:r>
-            <a:br>
-              <a:rPr lang="en-US" dirty="0"/>
-            </a:br>
-            <a:endParaRPr lang="en-US" dirty="0"/>
-          </a:p>
-          <a:p>
-            <a:pPr marL="171450" indent="-171450">
-              <a:buFont typeface="Arial" panose="020B0604020202020204" pitchFamily="34" charset="0"/>
-              <a:buChar char="•"/>
-            </a:pPr>
-            <a:r>
-              <a:rPr lang="en-US" dirty="0"/>
-              <a:t>Bad:</a:t>
-            </a:r>
-          </a:p>
-          <a:p>
-            <a:pPr marL="171450" indent="-171450">
-              <a:buFont typeface="Arial" panose="020B0604020202020204" pitchFamily="34" charset="0"/>
-              <a:buChar char="•"/>
-            </a:pPr>
-            <a:r>
-              <a:rPr lang="en-US" dirty="0"/>
-              <a:t>Client can still be unhappy with you</a:t>
-            </a:r>
-          </a:p>
-          <a:p>
-            <a:r>
-              <a:rPr lang="en-US" dirty="0"/>
-              <a:t>Likely to have some ambiguities in the requirements provided, consider domain-specific knowledge.</a:t>
-            </a:r>
-            <a:r>
-              <a:rPr lang="en-US" sz="1200" b="0" kern="1200" dirty="0">
+              <a:rPr lang="en-US" sz="1200" kern="1200" dirty="0">
                 <a:solidFill>
                   <a:schemeClr val="tx1"/>
                 </a:solidFill>
@@ -6082,16 +6102,32 @@
                 <a:ea typeface="+mn-ea"/>
                 <a:cs typeface="+mn-cs"/>
               </a:rPr>
-              <a:t> Assumptions or domain knowledge: existing behavior that is unchanged by the proposed system. </a:t>
+              <a:t>behaviors, attitudes, aptitudes of potential and existing users </a:t>
             </a:r>
             <a:endParaRPr lang="en-US" dirty="0">
               <a:effectLst/>
             </a:endParaRPr>
           </a:p>
           <a:p>
-            <a:pPr lvl="1"/>
-            <a:r>
-              <a:rPr lang="en-US" sz="1000" kern="1200" dirty="0">
+            <a:pPr marL="0" marR="0" lvl="0" indent="0" algn="l" defTabSz="914400" rtl="0" eaLnBrk="1" fontAlgn="auto" latinLnBrk="0" hangingPunct="1">
+              <a:lnSpc>
+                <a:spcPct val="100000"/>
+              </a:lnSpc>
+              <a:spcBef>
+                <a:spcPts val="0"/>
+              </a:spcBef>
+              <a:spcAft>
+                <a:spcPts val="0"/>
+              </a:spcAft>
+              <a:buClrTx/>
+              <a:buSzTx/>
+              <a:buFontTx/>
+              <a:buNone/>
+              <a:tabLst/>
+              <a:defRPr/>
+            </a:pPr>
+            <a:r>
+              <a:rPr lang="en-US" sz="1200" kern="1200" dirty="0">
                 <a:solidFill>
                   <a:schemeClr val="tx1"/>
                 </a:solidFill>
@@ -6100,10 +6136,32 @@
                 <a:ea typeface="+mn-ea"/>
                 <a:cs typeface="+mn-cs"/>
               </a:rPr>
-              <a:t>○  </a:t>
-            </a:r>
-            <a:r>
-              <a:rPr lang="en-US" sz="1200" b="0" kern="1200" dirty="0">
+              <a:t>technical, business, and environmental contexts - domain </a:t>
+            </a:r>
+            <a:endParaRPr lang="en-US" dirty="0">
+              <a:effectLst/>
+            </a:endParaRPr>
+          </a:p>
+          <a:p>
+            <a:pPr marL="0" marR="0" lvl="0" indent="0" algn="l" defTabSz="914400" rtl="0" eaLnBrk="1" fontAlgn="auto" latinLnBrk="0" hangingPunct="1">
+              <a:lnSpc>
+                <a:spcPct val="100000"/>
+              </a:lnSpc>
+              <a:spcBef>
+                <a:spcPts val="0"/>
+              </a:spcBef>
+              <a:spcAft>
+                <a:spcPts val="0"/>
+              </a:spcAft>
+              <a:buClrTx/>
+              <a:buSzTx/>
+              <a:buFontTx/>
+              <a:buNone/>
+              <a:tabLst/>
+              <a:defRPr/>
+            </a:pPr>
+            <a:r>
+              <a:rPr lang="en-US" sz="1200" kern="1200" dirty="0">
                 <a:solidFill>
                   <a:schemeClr val="tx1"/>
                 </a:solidFill>
@@ -6112,16 +6170,10 @@
                 <a:ea typeface="+mn-ea"/>
                 <a:cs typeface="+mn-cs"/>
               </a:rPr>
-              <a:t>Conditions under which the system is guaranteed to operate correctly. </a:t>
-            </a:r>
-            <a:endParaRPr lang="en-US" dirty="0">
-              <a:effectLst/>
-            </a:endParaRPr>
-          </a:p>
-          <a:p>
-            <a:pPr lvl="1"/>
-            <a:r>
-              <a:rPr lang="en-US" sz="1000" kern="1200" dirty="0">
+              <a:t>vocabulary and social aspects of domain</a:t>
+            </a:r>
+            <a:br>
+              <a:rPr lang="en-US" sz="1200" kern="1200" dirty="0">
                 <a:solidFill>
                   <a:schemeClr val="tx1"/>
                 </a:solidFill>
@@ -6130,10 +6182,9 @@
                 <a:ea typeface="+mn-ea"/>
                 <a:cs typeface="+mn-cs"/>
               </a:rPr>
-              <a:t>○  </a:t>
-            </a:r>
-            <a:r>
-              <a:rPr lang="en-US" sz="1200" b="0" kern="1200" dirty="0">
+            </a:br>
+            <a:r>
+              <a:rPr lang="en-US" sz="1200" kern="1200" dirty="0">
                 <a:solidFill>
                   <a:schemeClr val="tx1"/>
                 </a:solidFill>
@@ -6142,18 +6193,29 @@
                 <a:ea typeface="+mn-ea"/>
                 <a:cs typeface="+mn-cs"/>
               </a:rPr>
-              <a:t>How the environment will behave in response to the system’s outputs. </a:t>
+              <a:t>how existing products are used</a:t>
             </a:r>
             <a:endParaRPr lang="en-US" dirty="0">
               <a:effectLst/>
             </a:endParaRPr>
           </a:p>
           <a:p>
-            <a:pPr marL="171450" indent="-171450">
-              <a:buFont typeface="Arial" panose="020B0604020202020204" pitchFamily="34" charset="0"/>
-              <a:buChar char="•"/>
-            </a:pPr>
             <a:endParaRPr lang="en-US" dirty="0"/>
+          </a:p>
+          <a:p>
+            <a:r>
+              <a:rPr lang="en-US" dirty="0"/>
+              <a:t>In addition to helping drive requirements, this can also empower your team with more credibility + authority when working with client, helping inform decisions while making a better product</a:t>
+            </a:r>
+          </a:p>
+          <a:p>
+            <a:endParaRPr lang="en-US" dirty="0"/>
+          </a:p>
+          <a:p>
+            <a:r>
+              <a:rPr lang="en-US" dirty="0"/>
+              <a:t>Note – market research (who are our users, and what factors would influence their adoption of our product?) is yet another topic for yet another course, and probably shouldn’t be mentioned at all</a:t>
+            </a:r>
           </a:p>
         </p:txBody>
       </p:sp>
@@ -6183,7 +6245,7 @@
     </p:spTree>
     <p:extLst>
       <p:ext uri="{BB962C8B-B14F-4D97-AF65-F5344CB8AC3E}">
-        <p14:creationId xmlns:p14="http://schemas.microsoft.com/office/powerpoint/2010/main" val="1885342880"/>
+        <p14:creationId xmlns:p14="http://schemas.microsoft.com/office/powerpoint/2010/main" val="1731608179"/>
       </p:ext>
     </p:extLst>
   </p:cSld>
@@ -6238,12 +6300,16 @@
           <a:lstStyle/>
           <a:p>
             <a:r>
+              <a:rPr lang="en-US" dirty="0"/>
+              <a:t>Whatever combination of methods we choose to </a:t>
+            </a:r>
+            <a:r>
               <a:rPr lang="en-US" dirty="0" err="1"/>
-              <a:t>Needfinding</a:t>
-            </a:r>
-            <a:r>
-              <a:rPr lang="en-US" dirty="0"/>
-              <a:t> broadly describes a form of design research where we use qualitative methods to understand what product is needed. Product design research is quite literally the topic of another class, so we won’t go too far into depth here, other than to be sure that you are aware of its existence and its benefits</a:t>
+              <a:t>solict</a:t>
+            </a:r>
+            <a:r>
+              <a:rPr lang="en-US" dirty="0"/>
+              <a:t> our requirements, we probably need to document them somehow. Having documented requirements can certainly help make sure that the whole team is on board with what is being made, and to try to minimize having things “lost in translation” – you have something to look back on and say “did I make the thing I said I would make”</a:t>
             </a:r>
           </a:p>
           <a:p>
@@ -6252,8 +6318,20 @@
           <a:p>
             <a:r>
               <a:rPr lang="en-US" dirty="0"/>
-              <a:t>Kinds of qualitative data that you can gather:</a:t>
-            </a:r>
+              <a:t>It’s very important for our requirements documentation to include non-functional requirements, too, which might otherwise be implicit (unspoken)</a:t>
+            </a:r>
+          </a:p>
+          <a:p>
+            <a:endParaRPr lang="en-US" dirty="0"/>
+          </a:p>
+          <a:p>
+            <a:r>
+              <a:rPr lang="en-US" dirty="0"/>
+              <a:t>This documentation can also serve as a point of reference for us to iterate with a customer, refining the requirements, and ensuring that all stakeholders agree on their completeness/correctness.</a:t>
+            </a:r>
+          </a:p>
+          <a:p>
+            <a:endParaRPr lang="en-US" dirty="0"/>
           </a:p>
           <a:p>
             <a:pPr marL="0" marR="0" lvl="0" indent="0" algn="l" defTabSz="914400" rtl="0" eaLnBrk="1" fontAlgn="auto" latinLnBrk="0" hangingPunct="1">
@@ -6274,128 +6352,8 @@
               <a:defRPr/>
             </a:pPr>
             <a:r>
-              <a:rPr lang="en-US" sz="1200" kern="1200" dirty="0">
-                <a:solidFill>
-                  <a:schemeClr val="tx1"/>
-                </a:solidFill>
-                <a:effectLst/>
-                <a:latin typeface="+mn-lt"/>
-                <a:ea typeface="+mn-ea"/>
-                <a:cs typeface="+mn-cs"/>
-              </a:rPr>
-              <a:t>behaviors, attitudes, aptitudes of potential and existing users </a:t>
-            </a:r>
-            <a:endParaRPr lang="en-US" dirty="0">
-              <a:effectLst/>
-            </a:endParaRPr>
-          </a:p>
-          <a:p>
-            <a:pPr marL="0" marR="0" lvl="0" indent="0" algn="l" defTabSz="914400" rtl="0" eaLnBrk="1" fontAlgn="auto" latinLnBrk="0" hangingPunct="1">
-              <a:lnSpc>
-                <a:spcPct val="100000"/>
-              </a:lnSpc>
-              <a:spcBef>
-                <a:spcPts val="0"/>
-              </a:spcBef>
-              <a:spcAft>
-                <a:spcPts val="0"/>
-              </a:spcAft>
-              <a:buClrTx/>
-              <a:buSzTx/>
-              <a:buFontTx/>
-              <a:buNone/>
-              <a:tabLst/>
-              <a:defRPr/>
-            </a:pPr>
-            <a:r>
-              <a:rPr lang="en-US" sz="1200" kern="1200" dirty="0">
-                <a:solidFill>
-                  <a:schemeClr val="tx1"/>
-                </a:solidFill>
-                <a:effectLst/>
-                <a:latin typeface="+mn-lt"/>
-                <a:ea typeface="+mn-ea"/>
-                <a:cs typeface="+mn-cs"/>
-              </a:rPr>
-              <a:t>technical, business, and environmental contexts - domain </a:t>
-            </a:r>
-            <a:endParaRPr lang="en-US" dirty="0">
-              <a:effectLst/>
-            </a:endParaRPr>
-          </a:p>
-          <a:p>
-            <a:pPr marL="0" marR="0" lvl="0" indent="0" algn="l" defTabSz="914400" rtl="0" eaLnBrk="1" fontAlgn="auto" latinLnBrk="0" hangingPunct="1">
-              <a:lnSpc>
-                <a:spcPct val="100000"/>
-              </a:lnSpc>
-              <a:spcBef>
-                <a:spcPts val="0"/>
-              </a:spcBef>
-              <a:spcAft>
-                <a:spcPts val="0"/>
-              </a:spcAft>
-              <a:buClrTx/>
-              <a:buSzTx/>
-              <a:buFontTx/>
-              <a:buNone/>
-              <a:tabLst/>
-              <a:defRPr/>
-            </a:pPr>
-            <a:r>
-              <a:rPr lang="en-US" sz="1200" kern="1200" dirty="0">
-                <a:solidFill>
-                  <a:schemeClr val="tx1"/>
-                </a:solidFill>
-                <a:effectLst/>
-                <a:latin typeface="+mn-lt"/>
-                <a:ea typeface="+mn-ea"/>
-                <a:cs typeface="+mn-cs"/>
-              </a:rPr>
-              <a:t>vocabulary and social aspects of domain</a:t>
-            </a:r>
-            <a:br>
-              <a:rPr lang="en-US" sz="1200" kern="1200" dirty="0">
-                <a:solidFill>
-                  <a:schemeClr val="tx1"/>
-                </a:solidFill>
-                <a:effectLst/>
-                <a:latin typeface="+mn-lt"/>
-                <a:ea typeface="+mn-ea"/>
-                <a:cs typeface="+mn-cs"/>
-              </a:rPr>
-            </a:br>
-            <a:r>
-              <a:rPr lang="en-US" sz="1200" kern="1200" dirty="0">
-                <a:solidFill>
-                  <a:schemeClr val="tx1"/>
-                </a:solidFill>
-                <a:effectLst/>
-                <a:latin typeface="+mn-lt"/>
-                <a:ea typeface="+mn-ea"/>
-                <a:cs typeface="+mn-cs"/>
-              </a:rPr>
-              <a:t>how existing products are used</a:t>
-            </a:r>
-            <a:endParaRPr lang="en-US" dirty="0">
-              <a:effectLst/>
-            </a:endParaRPr>
-          </a:p>
-          <a:p>
-            <a:endParaRPr lang="en-US" dirty="0"/>
-          </a:p>
-          <a:p>
-            <a:r>
-              <a:rPr lang="en-US" dirty="0"/>
-              <a:t>In addition to helping drive requirements, this can also empower your team with more credibility + authority when working with client, helping inform decisions while making a better product</a:t>
-            </a:r>
-          </a:p>
-          <a:p>
-            <a:endParaRPr lang="en-US" dirty="0"/>
-          </a:p>
-          <a:p>
-            <a:r>
-              <a:rPr lang="en-US" dirty="0"/>
-              <a:t>Note – market research (who are our users, and what factors would influence their adoption of our product?) is yet another topic for yet another course, and probably shouldn’t be mentioned at all</a:t>
+              <a:rPr lang="en-US" dirty="0"/>
+              <a:t>There are a lot of options for how to do this…</a:t>
             </a:r>
           </a:p>
         </p:txBody>
@@ -6426,7 +6384,7 @@
     </p:spTree>
     <p:extLst>
       <p:ext uri="{BB962C8B-B14F-4D97-AF65-F5344CB8AC3E}">
-        <p14:creationId xmlns:p14="http://schemas.microsoft.com/office/powerpoint/2010/main" val="1731608179"/>
+        <p14:creationId xmlns:p14="http://schemas.microsoft.com/office/powerpoint/2010/main" val="2747267585"/>
       </p:ext>
     </p:extLst>
   </p:cSld>
@@ -6480,41 +6438,6 @@
           <a:bodyPr/>
           <a:lstStyle/>
           <a:p>
-            <a:r>
-              <a:rPr lang="en-US" dirty="0"/>
-              <a:t>Whatever combination of methods we choose to </a:t>
-            </a:r>
-            <a:r>
-              <a:rPr lang="en-US" dirty="0" err="1"/>
-              <a:t>solict</a:t>
-            </a:r>
-            <a:r>
-              <a:rPr lang="en-US" dirty="0"/>
-              <a:t> our requirements, we probably need to document them somehow. Having documented requirements can certainly help make sure that the whole team is on board with what is being made, and to try to minimize having things “lost in translation” – you have something to look back on and say “did I make the thing I said I would make”</a:t>
-            </a:r>
-          </a:p>
-          <a:p>
-            <a:endParaRPr lang="en-US" dirty="0"/>
-          </a:p>
-          <a:p>
-            <a:r>
-              <a:rPr lang="en-US" dirty="0"/>
-              <a:t>It’s very important for our requirements documentation to include non-functional requirements, too, which might otherwise be implicit (unspoken)</a:t>
-            </a:r>
-          </a:p>
-          <a:p>
-            <a:endParaRPr lang="en-US" dirty="0"/>
-          </a:p>
-          <a:p>
-            <a:r>
-              <a:rPr lang="en-US" dirty="0"/>
-              <a:t>This documentation can also serve as a point of reference for us to iterate with a customer, refining the requirements, and ensuring that all stakeholders agree on their completeness/correctness.</a:t>
-            </a:r>
-          </a:p>
-          <a:p>
-            <a:endParaRPr lang="en-US" dirty="0"/>
-          </a:p>
-          <a:p>
             <a:pPr marL="0" marR="0" lvl="0" indent="0" algn="l" defTabSz="914400" rtl="0" eaLnBrk="1" fontAlgn="auto" latinLnBrk="0" hangingPunct="1">
               <a:lnSpc>
                 <a:spcPct val="100000"/>
@@ -6534,8 +6457,103 @@
             </a:pPr>
             <a:r>
               <a:rPr lang="en-US" dirty="0"/>
-              <a:t>There are a lot of options for how to do this…</a:t>
-            </a:r>
+              <a:t>Non-functional requirements capture the </a:t>
+            </a:r>
+            <a:r>
+              <a:rPr lang="en-US" i="1" dirty="0"/>
+              <a:t>quality goals</a:t>
+            </a:r>
+            <a:r>
+              <a:rPr lang="en-US" i="0" dirty="0"/>
+              <a:t> of a system. </a:t>
+            </a:r>
+          </a:p>
+          <a:p>
+            <a:pPr marL="0" marR="0" lvl="0" indent="0" algn="l" defTabSz="914400" rtl="0" eaLnBrk="1" fontAlgn="auto" latinLnBrk="0" hangingPunct="1">
+              <a:lnSpc>
+                <a:spcPct val="100000"/>
+              </a:lnSpc>
+              <a:spcBef>
+                <a:spcPts val="0"/>
+              </a:spcBef>
+              <a:spcAft>
+                <a:spcPts val="0"/>
+              </a:spcAft>
+              <a:buClrTx/>
+              <a:buSzTx/>
+              <a:buFontTx/>
+              <a:buNone/>
+              <a:tabLst/>
+              <a:defRPr/>
+            </a:pPr>
+            <a:endParaRPr lang="en-US" i="0" dirty="0"/>
+          </a:p>
+          <a:p>
+            <a:pPr marL="0" marR="0" lvl="0" indent="0" algn="l" defTabSz="914400" rtl="0" eaLnBrk="1" fontAlgn="auto" latinLnBrk="0" hangingPunct="1">
+              <a:lnSpc>
+                <a:spcPct val="100000"/>
+              </a:lnSpc>
+              <a:spcBef>
+                <a:spcPts val="0"/>
+              </a:spcBef>
+              <a:spcAft>
+                <a:spcPts val="0"/>
+              </a:spcAft>
+              <a:buClrTx/>
+              <a:buSzTx/>
+              <a:buFontTx/>
+              <a:buNone/>
+              <a:tabLst/>
+              <a:defRPr/>
+            </a:pPr>
+            <a:r>
+              <a:rPr lang="en-US" i="0" dirty="0"/>
+              <a:t>Here is a partial list of some quality goals, or non-functional requirements that you might need to consider on a project. Note that this is only a partial list, but we included some examples to demonstrate how precise you can be.</a:t>
+            </a:r>
+          </a:p>
+          <a:p>
+            <a:pPr marL="0" marR="0" lvl="0" indent="0" algn="l" defTabSz="914400" rtl="0" eaLnBrk="1" fontAlgn="auto" latinLnBrk="0" hangingPunct="1">
+              <a:lnSpc>
+                <a:spcPct val="100000"/>
+              </a:lnSpc>
+              <a:spcBef>
+                <a:spcPts val="0"/>
+              </a:spcBef>
+              <a:spcAft>
+                <a:spcPts val="0"/>
+              </a:spcAft>
+              <a:buClrTx/>
+              <a:buSzTx/>
+              <a:buFontTx/>
+              <a:buNone/>
+              <a:tabLst/>
+              <a:defRPr/>
+            </a:pPr>
+            <a:endParaRPr lang="en-US" i="0" dirty="0"/>
+          </a:p>
+          <a:p>
+            <a:pPr marL="0" marR="0" lvl="0" indent="0" algn="l" defTabSz="914400" rtl="0" eaLnBrk="1" fontAlgn="auto" latinLnBrk="0" hangingPunct="1">
+              <a:lnSpc>
+                <a:spcPct val="100000"/>
+              </a:lnSpc>
+              <a:spcBef>
+                <a:spcPts val="0"/>
+              </a:spcBef>
+              <a:spcAft>
+                <a:spcPts val="0"/>
+              </a:spcAft>
+              <a:buClrTx/>
+              <a:buSzTx/>
+              <a:buFontTx/>
+              <a:buNone/>
+              <a:tabLst/>
+              <a:defRPr/>
+            </a:pPr>
+            <a:r>
+              <a:rPr lang="en-US" i="0" dirty="0"/>
+              <a:t>For example, one high-level goal is to say “I want performance”. But what does performance mean? You probably mean to say that you expect that the system has some particular capacity (in terms of simultaneous users), who can simultaneously have their requests satisfied within some response time. That’s still not the whole picture though, because you didn’t specify the efficiency of your system: what hardware resources does it use to achieve that performance?</a:t>
+            </a:r>
+            <a:endParaRPr lang="en-US" dirty="0"/>
           </a:p>
         </p:txBody>
       </p:sp>
@@ -6565,7 +6583,7 @@
     </p:spTree>
     <p:extLst>
       <p:ext uri="{BB962C8B-B14F-4D97-AF65-F5344CB8AC3E}">
-        <p14:creationId xmlns:p14="http://schemas.microsoft.com/office/powerpoint/2010/main" val="2747267585"/>
+        <p14:creationId xmlns:p14="http://schemas.microsoft.com/office/powerpoint/2010/main" val="1539519105"/>
       </p:ext>
     </p:extLst>
   </p:cSld>
@@ -6729,7 +6747,7 @@
           <a:p>
             <a:fld id="{5D2A64DE-480B-420F-9649-4F8E696E08E0}" type="datetime1">
               <a:rPr lang="en-US" smtClean="0"/>
-              <a:t>1/25/22</a:t>
+              <a:t>1/26/22</a:t>
             </a:fld>
             <a:endParaRPr lang="en-US"/>
           </a:p>
@@ -7053,7 +7071,7 @@
           <a:p>
             <a:fld id="{EA476A42-A091-4468-A075-64A31BE59948}" type="datetime1">
               <a:rPr lang="en-US" smtClean="0"/>
-              <a:t>1/25/22</a:t>
+              <a:t>1/26/22</a:t>
             </a:fld>
             <a:endParaRPr lang="en-US"/>
           </a:p>
@@ -7251,7 +7269,7 @@
           <a:p>
             <a:fld id="{0D3616D0-8311-4107-9726-6B805E7D05BA}" type="datetime1">
               <a:rPr lang="en-US" smtClean="0"/>
-              <a:t>1/25/22</a:t>
+              <a:t>1/26/22</a:t>
             </a:fld>
             <a:endParaRPr lang="en-US"/>
           </a:p>
@@ -7459,7 +7477,7 @@
           <a:p>
             <a:fld id="{3BC2557A-5C88-417A-A763-5AC779462A5F}" type="datetime1">
               <a:rPr lang="en-US" smtClean="0"/>
-              <a:t>1/25/22</a:t>
+              <a:t>1/26/22</a:t>
             </a:fld>
             <a:endParaRPr lang="en-US"/>
           </a:p>
@@ -7983,7 +8001,7 @@
           <a:p>
             <a:fld id="{07C7BFD4-467E-4EDE-93EA-052F5B39A4E5}" type="datetime1">
               <a:rPr lang="en-US" smtClean="0"/>
-              <a:t>1/25/22</a:t>
+              <a:t>1/26/22</a:t>
             </a:fld>
             <a:endParaRPr lang="en-US"/>
           </a:p>
@@ -8233,7 +8251,7 @@
           <a:p>
             <a:fld id="{07C7BFD4-467E-4EDE-93EA-052F5B39A4E5}" type="datetime1">
               <a:rPr lang="en-US" smtClean="0"/>
-              <a:t>1/25/22</a:t>
+              <a:t>1/26/22</a:t>
             </a:fld>
             <a:endParaRPr lang="en-US"/>
           </a:p>
@@ -8415,7 +8433,7 @@
           <a:p>
             <a:fld id="{109E55A0-C911-4F03-82FC-7E5926047D46}" type="datetime1">
               <a:rPr lang="en-US" smtClean="0"/>
-              <a:t>1/25/22</a:t>
+              <a:t>1/26/22</a:t>
             </a:fld>
             <a:endParaRPr lang="en-US"/>
           </a:p>
@@ -8728,7 +8746,7 @@
           <a:p>
             <a:fld id="{A533CBE2-D5BE-47AC-ADC2-9CDFC1D0CF90}" type="datetime1">
               <a:rPr lang="en-US" smtClean="0"/>
-              <a:t>1/25/22</a:t>
+              <a:t>1/26/22</a:t>
             </a:fld>
             <a:endParaRPr lang="en-US"/>
           </a:p>
@@ -9029,7 +9047,7 @@
           <a:p>
             <a:fld id="{39B7EDB1-CE74-4951-85A2-0B01C2128E28}" type="datetime1">
               <a:rPr lang="en-US" smtClean="0"/>
-              <a:t>1/25/22</a:t>
+              <a:t>1/26/22</a:t>
             </a:fld>
             <a:endParaRPr lang="en-US"/>
           </a:p>
@@ -9477,7 +9495,7 @@
           <a:p>
             <a:fld id="{2BC7EB92-A5C2-4807-A9DC-9EDE6CBFB241}" type="datetime1">
               <a:rPr lang="en-US" smtClean="0"/>
-              <a:t>1/25/22</a:t>
+              <a:t>1/26/22</a:t>
             </a:fld>
             <a:endParaRPr lang="en-US"/>
           </a:p>
@@ -9590,7 +9608,7 @@
           <a:p>
             <a:fld id="{2B7B7EE0-7771-4CD5-9B2B-3550753A54A1}" type="datetime1">
               <a:rPr lang="en-US" smtClean="0"/>
-              <a:t>1/25/22</a:t>
+              <a:t>1/26/22</a:t>
             </a:fld>
             <a:endParaRPr lang="en-US"/>
           </a:p>
@@ -9901,7 +9919,7 @@
           <a:p>
             <a:fld id="{F8B318B3-0E87-4416-A9B8-D891968C2727}" type="datetime1">
               <a:rPr lang="en-US" smtClean="0"/>
-              <a:t>1/25/22</a:t>
+              <a:t>1/26/22</a:t>
             </a:fld>
             <a:endParaRPr lang="en-US"/>
           </a:p>
@@ -10142,7 +10160,7 @@
           <a:p>
             <a:fld id="{54D997E8-DDEE-43F1-8D9B-F8A1E11DE488}" type="datetime1">
               <a:rPr lang="en-US" smtClean="0"/>
-              <a:t>1/25/22</a:t>
+              <a:t>1/26/22</a:t>
             </a:fld>
             <a:endParaRPr lang="en-US"/>
           </a:p>
@@ -10770,6 +10788,170 @@
 <file path=ppt/slides/slide10.xml><?xml version="1.0" encoding="utf-8"?>
 <p:sld xmlns:a="http://schemas.openxmlformats.org/drawingml/2006/main" xmlns:r="http://schemas.openxmlformats.org/officeDocument/2006/relationships" xmlns:p="http://schemas.openxmlformats.org/presentationml/2006/main">
   <p:cSld>
+    <p:spTree>
+      <p:nvGrpSpPr>
+        <p:cNvPr id="1" name=""/>
+        <p:cNvGrpSpPr/>
+        <p:nvPr/>
+      </p:nvGrpSpPr>
+      <p:grpSpPr>
+        <a:xfrm>
+          <a:off x="0" y="0"/>
+          <a:ext cx="0" cy="0"/>
+          <a:chOff x="0" y="0"/>
+          <a:chExt cx="0" cy="0"/>
+        </a:xfrm>
+      </p:grpSpPr>
+      <p:sp>
+        <p:nvSpPr>
+          <p:cNvPr id="2" name="Title 1">
+            <a:extLst>
+              <a:ext uri="{FF2B5EF4-FFF2-40B4-BE49-F238E27FC236}">
+                <a16:creationId xmlns:a16="http://schemas.microsoft.com/office/drawing/2014/main" id="{16F86D58-152F-496B-BA81-FDA5B100832A}"/>
+              </a:ext>
+            </a:extLst>
+          </p:cNvPr>
+          <p:cNvSpPr>
+            <a:spLocks noGrp="1"/>
+          </p:cNvSpPr>
+          <p:nvPr>
+            <p:ph type="title"/>
+          </p:nvPr>
+        </p:nvSpPr>
+        <p:spPr/>
+        <p:txBody>
+          <a:bodyPr/>
+          <a:lstStyle/>
+          <a:p>
+            <a:r>
+              <a:rPr lang="en-US" dirty="0"/>
+              <a:t>Documentation should also capture non-functional requirements</a:t>
+            </a:r>
+          </a:p>
+        </p:txBody>
+      </p:sp>
+      <p:sp>
+        <p:nvSpPr>
+          <p:cNvPr id="3" name="Content Placeholder 2">
+            <a:extLst>
+              <a:ext uri="{FF2B5EF4-FFF2-40B4-BE49-F238E27FC236}">
+                <a16:creationId xmlns:a16="http://schemas.microsoft.com/office/drawing/2014/main" id="{E9F968A6-CC31-4AE6-83F3-85021744E177}"/>
+              </a:ext>
+            </a:extLst>
+          </p:cNvPr>
+          <p:cNvSpPr>
+            <a:spLocks noGrp="1"/>
+          </p:cNvSpPr>
+          <p:nvPr>
+            <p:ph idx="1"/>
+          </p:nvPr>
+        </p:nvSpPr>
+        <p:spPr>
+          <a:xfrm>
+            <a:off x="838200" y="1500160"/>
+            <a:ext cx="10515600" cy="4351338"/>
+          </a:xfrm>
+        </p:spPr>
+        <p:txBody>
+          <a:bodyPr>
+            <a:normAutofit/>
+          </a:bodyPr>
+          <a:lstStyle/>
+          <a:p>
+            <a:r>
+              <a:rPr lang="en-US" dirty="0"/>
+              <a:t>Qualities that reflect the evolution of the system</a:t>
+            </a:r>
+          </a:p>
+          <a:p>
+            <a:pPr lvl="1"/>
+            <a:r>
+              <a:rPr lang="en-US" dirty="0"/>
+              <a:t>Testability</a:t>
+            </a:r>
+          </a:p>
+          <a:p>
+            <a:pPr lvl="1"/>
+            <a:r>
+              <a:rPr lang="en-US" dirty="0"/>
+              <a:t>Maintainability</a:t>
+            </a:r>
+          </a:p>
+          <a:p>
+            <a:pPr lvl="1"/>
+            <a:r>
+              <a:rPr lang="en-US" dirty="0"/>
+              <a:t>Extensibility</a:t>
+            </a:r>
+          </a:p>
+          <a:p>
+            <a:pPr lvl="1"/>
+            <a:r>
+              <a:rPr lang="en-US" dirty="0"/>
+              <a:t>Scalability</a:t>
+            </a:r>
+          </a:p>
+          <a:p>
+            <a:r>
+              <a:rPr lang="en-US" dirty="0"/>
+              <a:t>Example: “A 3</a:t>
+            </a:r>
+            <a:r>
+              <a:rPr lang="en-US" baseline="30000" dirty="0"/>
+              <a:t>rd</a:t>
+            </a:r>
+            <a:r>
+              <a:rPr lang="en-US" dirty="0"/>
+              <a:t> party component built conforming to the API defined in the Canvas LMS specification can interface create, modify, and delete assignments on behalf of an authenticated user”</a:t>
+            </a:r>
+          </a:p>
+        </p:txBody>
+      </p:sp>
+      <p:sp>
+        <p:nvSpPr>
+          <p:cNvPr id="4" name="Slide Number Placeholder 3">
+            <a:extLst>
+              <a:ext uri="{FF2B5EF4-FFF2-40B4-BE49-F238E27FC236}">
+                <a16:creationId xmlns:a16="http://schemas.microsoft.com/office/drawing/2014/main" id="{C7C3DEB3-F948-4B7E-8BDA-FB7ABCF7A993}"/>
+              </a:ext>
+            </a:extLst>
+          </p:cNvPr>
+          <p:cNvSpPr>
+            <a:spLocks noGrp="1"/>
+          </p:cNvSpPr>
+          <p:nvPr>
+            <p:ph type="sldNum" sz="quarter" idx="12"/>
+          </p:nvPr>
+        </p:nvSpPr>
+        <p:spPr/>
+        <p:txBody>
+          <a:bodyPr/>
+          <a:lstStyle/>
+          <a:p>
+            <a:fld id="{20F37917-FD3A-4669-9018-DA04BCDD3D75}" type="slidenum">
+              <a:rPr lang="en-US" smtClean="0"/>
+              <a:t>10</a:t>
+            </a:fld>
+            <a:endParaRPr lang="en-US"/>
+          </a:p>
+        </p:txBody>
+      </p:sp>
+    </p:spTree>
+    <p:extLst>
+      <p:ext uri="{BB962C8B-B14F-4D97-AF65-F5344CB8AC3E}">
+        <p14:creationId xmlns:p14="http://schemas.microsoft.com/office/powerpoint/2010/main" val="667178669"/>
+      </p:ext>
+    </p:extLst>
+  </p:cSld>
+  <p:clrMapOvr>
+    <a:masterClrMapping/>
+  </p:clrMapOvr>
+</p:sld>
+</file>
+
+<file path=ppt/slides/slide11.xml><?xml version="1.0" encoding="utf-8"?>
+<p:sld xmlns:a="http://schemas.openxmlformats.org/drawingml/2006/main" xmlns:r="http://schemas.openxmlformats.org/officeDocument/2006/relationships" xmlns:p="http://schemas.openxmlformats.org/presentationml/2006/main">
+  <p:cSld>
     <p:bg>
       <p:bgPr>
         <a:solidFill>
@@ -10794,10 +10976,10 @@
       </p:grpSpPr>
       <p:sp useBgFill="1">
         <p:nvSpPr>
-          <p:cNvPr id="22" name="Rectangle 21">
+          <p:cNvPr id="29" name="Rectangle 28">
             <a:extLst>
               <a:ext uri="{FF2B5EF4-FFF2-40B4-BE49-F238E27FC236}">
-                <a16:creationId xmlns:a16="http://schemas.microsoft.com/office/drawing/2014/main" id="{69D47016-023F-44BD-981C-50E7A10A6609}"/>
+                <a16:creationId xmlns:a16="http://schemas.microsoft.com/office/drawing/2014/main" id="{88263A24-0C1F-4677-B43C-4AE14E276B27}"/>
               </a:ext>
               <a:ext uri="{C183D7F6-B498-43B3-948B-1728B52AA6E4}">
                 <adec:decorative xmlns:adec="http://schemas.microsoft.com/office/drawing/2017/decorative" val="1"/>
@@ -10818,7 +11000,7 @@
         <p:spPr>
           <a:xfrm>
             <a:off x="0" y="0"/>
-            <a:ext cx="12188952" cy="6858000"/>
+            <a:ext cx="12192000" cy="6858000"/>
           </a:xfrm>
           <a:prstGeom prst="rect">
             <a:avLst/>
@@ -10848,51 +11030,16 @@
           <a:lstStyle/>
           <a:p>
             <a:pPr algn="ctr"/>
-            <a:endParaRPr lang="en-US" dirty="0"/>
-          </a:p>
-        </p:txBody>
-      </p:sp>
-      <p:sp>
-        <p:nvSpPr>
-          <p:cNvPr id="2" name="Title 1">
+            <a:endParaRPr lang="en-US"/>
+          </a:p>
+        </p:txBody>
+      </p:sp>
+      <p:sp useBgFill="1">
+        <p:nvSpPr>
+          <p:cNvPr id="31" name="Rectangle 30">
             <a:extLst>
               <a:ext uri="{FF2B5EF4-FFF2-40B4-BE49-F238E27FC236}">
-                <a16:creationId xmlns:a16="http://schemas.microsoft.com/office/drawing/2014/main" id="{0B4A7557-5B1C-1F4D-B269-464364F62CBB}"/>
-              </a:ext>
-            </a:extLst>
-          </p:cNvPr>
-          <p:cNvSpPr>
-            <a:spLocks noGrp="1"/>
-          </p:cNvSpPr>
-          <p:nvPr>
-            <p:ph type="title"/>
-          </p:nvPr>
-        </p:nvSpPr>
-        <p:spPr>
-          <a:xfrm>
-            <a:off x="630936" y="457200"/>
-            <a:ext cx="4343400" cy="1929384"/>
-          </a:xfrm>
-        </p:spPr>
-        <p:txBody>
-          <a:bodyPr anchor="ctr">
-            <a:normAutofit/>
-          </a:bodyPr>
-          <a:lstStyle/>
-          <a:p>
-            <a:r>
-              <a:rPr lang="en-US" sz="4400"/>
-              <a:t>Documenting Requirements: Specifications</a:t>
-            </a:r>
-          </a:p>
-        </p:txBody>
-      </p:sp>
-      <p:sp>
-        <p:nvSpPr>
-          <p:cNvPr id="24" name="sketchy line">
-            <a:extLst>
-              <a:ext uri="{FF2B5EF4-FFF2-40B4-BE49-F238E27FC236}">
-                <a16:creationId xmlns:a16="http://schemas.microsoft.com/office/drawing/2014/main" id="{6D8B37B0-0682-433E-BC8D-498C04ABD9A7}"/>
+                <a16:creationId xmlns:a16="http://schemas.microsoft.com/office/drawing/2014/main" id="{0ADDB668-2CA4-4D2B-9C34-3487CA330BA8}"/>
               </a:ext>
               <a:ext uri="{C183D7F6-B498-43B3-948B-1728B52AA6E4}">
                 <adec:decorative xmlns:adec="http://schemas.microsoft.com/office/drawing/2017/decorative" val="1"/>
@@ -10911,178 +11058,199 @@
           </p:nvPr>
         </p:nvSpPr>
         <p:spPr>
-          <a:xfrm rot="5400000">
-            <a:off x="4471415" y="1412748"/>
-            <a:ext cx="1554480" cy="18288"/>
+          <a:xfrm>
+            <a:off x="551553" y="304802"/>
+            <a:ext cx="11097349" cy="1573149"/>
           </a:xfrm>
-          <a:custGeom>
+          <a:prstGeom prst="rect">
             <a:avLst/>
-            <a:gdLst>
-              <a:gd name="connsiteX0" fmla="*/ 0 w 1554480"/>
-              <a:gd name="connsiteY0" fmla="*/ 0 h 18288"/>
-              <a:gd name="connsiteX1" fmla="*/ 549250 w 1554480"/>
-              <a:gd name="connsiteY1" fmla="*/ 0 h 18288"/>
-              <a:gd name="connsiteX2" fmla="*/ 1082954 w 1554480"/>
-              <a:gd name="connsiteY2" fmla="*/ 0 h 18288"/>
-              <a:gd name="connsiteX3" fmla="*/ 1554480 w 1554480"/>
-              <a:gd name="connsiteY3" fmla="*/ 0 h 18288"/>
-              <a:gd name="connsiteX4" fmla="*/ 1554480 w 1554480"/>
-              <a:gd name="connsiteY4" fmla="*/ 18288 h 18288"/>
-              <a:gd name="connsiteX5" fmla="*/ 1067410 w 1554480"/>
-              <a:gd name="connsiteY5" fmla="*/ 18288 h 18288"/>
-              <a:gd name="connsiteX6" fmla="*/ 549250 w 1554480"/>
-              <a:gd name="connsiteY6" fmla="*/ 18288 h 18288"/>
-              <a:gd name="connsiteX7" fmla="*/ 0 w 1554480"/>
-              <a:gd name="connsiteY7" fmla="*/ 18288 h 18288"/>
-              <a:gd name="connsiteX8" fmla="*/ 0 w 1554480"/>
-              <a:gd name="connsiteY8" fmla="*/ 0 h 18288"/>
-            </a:gdLst>
-            <a:ahLst/>
-            <a:cxnLst>
-              <a:cxn ang="0">
-                <a:pos x="connsiteX0" y="connsiteY0"/>
-              </a:cxn>
-              <a:cxn ang="0">
-                <a:pos x="connsiteX1" y="connsiteY1"/>
-              </a:cxn>
-              <a:cxn ang="0">
-                <a:pos x="connsiteX2" y="connsiteY2"/>
-              </a:cxn>
-              <a:cxn ang="0">
-                <a:pos x="connsiteX3" y="connsiteY3"/>
-              </a:cxn>
-              <a:cxn ang="0">
-                <a:pos x="connsiteX4" y="connsiteY4"/>
-              </a:cxn>
-              <a:cxn ang="0">
-                <a:pos x="connsiteX5" y="connsiteY5"/>
-              </a:cxn>
-              <a:cxn ang="0">
-                <a:pos x="connsiteX6" y="connsiteY6"/>
-              </a:cxn>
-              <a:cxn ang="0">
-                <a:pos x="connsiteX7" y="connsiteY7"/>
-              </a:cxn>
-              <a:cxn ang="0">
-                <a:pos x="connsiteX8" y="connsiteY8"/>
-              </a:cxn>
-            </a:cxnLst>
-            <a:rect l="l" t="t" r="r" b="b"/>
-            <a:pathLst>
-              <a:path w="1554480" h="18288" fill="none" extrusionOk="0">
-                <a:moveTo>
-                  <a:pt x="0" y="0"/>
-                </a:moveTo>
-                <a:cubicBezTo>
-                  <a:pt x="114141" y="-19864"/>
-                  <a:pt x="345055" y="-1657"/>
-                  <a:pt x="549250" y="0"/>
-                </a:cubicBezTo>
-                <a:cubicBezTo>
-                  <a:pt x="753445" y="1657"/>
-                  <a:pt x="862292" y="-5674"/>
-                  <a:pt x="1082954" y="0"/>
-                </a:cubicBezTo>
-                <a:cubicBezTo>
-                  <a:pt x="1303616" y="5674"/>
-                  <a:pt x="1363530" y="4537"/>
-                  <a:pt x="1554480" y="0"/>
-                </a:cubicBezTo>
-                <a:cubicBezTo>
-                  <a:pt x="1554963" y="7176"/>
-                  <a:pt x="1553909" y="13682"/>
-                  <a:pt x="1554480" y="18288"/>
-                </a:cubicBezTo>
-                <a:cubicBezTo>
-                  <a:pt x="1338847" y="6127"/>
-                  <a:pt x="1215066" y="37851"/>
-                  <a:pt x="1067410" y="18288"/>
-                </a:cubicBezTo>
-                <a:cubicBezTo>
-                  <a:pt x="919754" y="-1275"/>
-                  <a:pt x="800465" y="3080"/>
-                  <a:pt x="549250" y="18288"/>
-                </a:cubicBezTo>
-                <a:cubicBezTo>
-                  <a:pt x="298035" y="33496"/>
-                  <a:pt x="158868" y="22769"/>
-                  <a:pt x="0" y="18288"/>
-                </a:cubicBezTo>
-                <a:cubicBezTo>
-                  <a:pt x="-655" y="13237"/>
-                  <a:pt x="709" y="4645"/>
-                  <a:pt x="0" y="0"/>
-                </a:cubicBezTo>
-                <a:close/>
-              </a:path>
-              <a:path w="1554480" h="18288" stroke="0" extrusionOk="0">
-                <a:moveTo>
-                  <a:pt x="0" y="0"/>
-                </a:moveTo>
-                <a:cubicBezTo>
-                  <a:pt x="249941" y="-58"/>
-                  <a:pt x="367334" y="23448"/>
-                  <a:pt x="502615" y="0"/>
-                </a:cubicBezTo>
-                <a:cubicBezTo>
-                  <a:pt x="637897" y="-23448"/>
-                  <a:pt x="813653" y="-20418"/>
-                  <a:pt x="974141" y="0"/>
-                </a:cubicBezTo>
-                <a:cubicBezTo>
-                  <a:pt x="1134629" y="20418"/>
-                  <a:pt x="1268772" y="6288"/>
-                  <a:pt x="1554480" y="0"/>
-                </a:cubicBezTo>
-                <a:cubicBezTo>
-                  <a:pt x="1554917" y="7222"/>
-                  <a:pt x="1555359" y="13299"/>
-                  <a:pt x="1554480" y="18288"/>
-                </a:cubicBezTo>
-                <a:cubicBezTo>
-                  <a:pt x="1336087" y="12172"/>
-                  <a:pt x="1310024" y="19759"/>
-                  <a:pt x="1067410" y="18288"/>
-                </a:cubicBezTo>
-                <a:cubicBezTo>
-                  <a:pt x="824796" y="16818"/>
-                  <a:pt x="787902" y="34647"/>
-                  <a:pt x="518160" y="18288"/>
-                </a:cubicBezTo>
-                <a:cubicBezTo>
-                  <a:pt x="248418" y="1930"/>
-                  <a:pt x="133160" y="9205"/>
-                  <a:pt x="0" y="18288"/>
-                </a:cubicBezTo>
-                <a:cubicBezTo>
-                  <a:pt x="-643" y="9451"/>
-                  <a:pt x="-340" y="7114"/>
-                  <a:pt x="0" y="0"/>
-                </a:cubicBezTo>
-                <a:close/>
-              </a:path>
-            </a:pathLst>
-          </a:custGeom>
+          </a:prstGeom>
+          <a:ln w="12700">
+            <a:solidFill>
+              <a:srgbClr val="DEDEDE"/>
+            </a:solidFill>
+          </a:ln>
+          <a:effectLst>
+            <a:outerShdw blurRad="50800" dist="38100" dir="2700000" algn="tl" rotWithShape="0">
+              <a:schemeClr val="bg2">
+                <a:lumMod val="85000"/>
+                <a:alpha val="50000"/>
+              </a:schemeClr>
+            </a:outerShdw>
+          </a:effectLst>
+        </p:spPr>
+        <p:style>
+          <a:lnRef idx="2">
+            <a:schemeClr val="accent1">
+              <a:shade val="50000"/>
+            </a:schemeClr>
+          </a:lnRef>
+          <a:fillRef idx="1">
+            <a:schemeClr val="accent1"/>
+          </a:fillRef>
+          <a:effectRef idx="0">
+            <a:schemeClr val="accent1"/>
+          </a:effectRef>
+          <a:fontRef idx="minor">
+            <a:schemeClr val="lt1"/>
+          </a:fontRef>
+        </p:style>
+        <p:txBody>
+          <a:bodyPr rtlCol="0" anchor="ctr"/>
+          <a:lstStyle/>
+          <a:p>
+            <a:pPr marL="0" marR="0" lvl="0" indent="0" algn="ctr" defTabSz="914400" rtl="0" eaLnBrk="1" fontAlgn="auto" latinLnBrk="0" hangingPunct="1">
+              <a:lnSpc>
+                <a:spcPct val="100000"/>
+              </a:lnSpc>
+              <a:spcBef>
+                <a:spcPts val="0"/>
+              </a:spcBef>
+              <a:spcAft>
+                <a:spcPts val="0"/>
+              </a:spcAft>
+              <a:buClrTx/>
+              <a:buSzTx/>
+              <a:buFontTx/>
+              <a:buNone/>
+              <a:tabLst/>
+              <a:defRPr/>
+            </a:pPr>
+            <a:endParaRPr kumimoji="0" lang="en-US" sz="1800" b="0" i="0" u="none" strike="noStrike" kern="1200" cap="none" spc="0" normalizeH="0" baseline="0" noProof="0">
+              <a:ln>
+                <a:noFill/>
+              </a:ln>
+              <a:solidFill>
+                <a:prstClr val="white"/>
+              </a:solidFill>
+              <a:effectLst/>
+              <a:uLnTx/>
+              <a:uFillTx/>
+              <a:latin typeface="Calibri" panose="020F0502020204030204"/>
+              <a:ea typeface="+mn-ea"/>
+              <a:cs typeface="+mn-cs"/>
+            </a:endParaRPr>
+          </a:p>
+        </p:txBody>
+      </p:sp>
+      <p:sp>
+        <p:nvSpPr>
+          <p:cNvPr id="2" name="Title 1">
+            <a:extLst>
+              <a:ext uri="{FF2B5EF4-FFF2-40B4-BE49-F238E27FC236}">
+                <a16:creationId xmlns:a16="http://schemas.microsoft.com/office/drawing/2014/main" id="{0B4A7557-5B1C-1F4D-B269-464364F62CBB}"/>
+              </a:ext>
+            </a:extLst>
+          </p:cNvPr>
+          <p:cNvSpPr>
+            <a:spLocks noGrp="1"/>
+          </p:cNvSpPr>
+          <p:nvPr>
+            <p:ph type="title"/>
+          </p:nvPr>
+        </p:nvSpPr>
+        <p:spPr>
+          <a:xfrm>
+            <a:off x="868680" y="405575"/>
+            <a:ext cx="5001768" cy="1371600"/>
+          </a:xfrm>
+        </p:spPr>
+        <p:txBody>
+          <a:bodyPr vert="horz" lIns="91440" tIns="45720" rIns="91440" bIns="45720" rtlCol="0" anchor="ctr">
+            <a:normAutofit/>
+          </a:bodyPr>
+          <a:lstStyle/>
+          <a:p>
+            <a:r>
+              <a:rPr lang="en-US" sz="3100">
+                <a:solidFill>
+                  <a:schemeClr val="tx1"/>
+                </a:solidFill>
+                <a:latin typeface="+mj-lt"/>
+                <a:ea typeface="+mj-ea"/>
+              </a:rPr>
+              <a:t>Formal Specifications can be used to document requirements</a:t>
+            </a:r>
+          </a:p>
+        </p:txBody>
+      </p:sp>
+      <p:sp>
+        <p:nvSpPr>
+          <p:cNvPr id="3" name="Content Placeholder 2">
+            <a:extLst>
+              <a:ext uri="{FF2B5EF4-FFF2-40B4-BE49-F238E27FC236}">
+                <a16:creationId xmlns:a16="http://schemas.microsoft.com/office/drawing/2014/main" id="{E89FC48A-16C8-684B-A1DE-CE9B7D5AB066}"/>
+              </a:ext>
+            </a:extLst>
+          </p:cNvPr>
+          <p:cNvSpPr>
+            <a:spLocks noGrp="1"/>
+          </p:cNvSpPr>
+          <p:nvPr>
+            <p:ph idx="1"/>
+          </p:nvPr>
+        </p:nvSpPr>
+        <p:spPr>
+          <a:xfrm>
+            <a:off x="6382512" y="498698"/>
+            <a:ext cx="4940808" cy="1185353"/>
+          </a:xfrm>
+        </p:spPr>
+        <p:txBody>
+          <a:bodyPr vert="horz" lIns="91440" tIns="45720" rIns="91440" bIns="45720" rtlCol="0" anchor="ctr">
+            <a:normAutofit fontScale="92500" lnSpcReduction="20000"/>
+          </a:bodyPr>
+          <a:lstStyle/>
+          <a:p>
+            <a:r>
+              <a:rPr lang="en-US" sz="2400" dirty="0"/>
+              <a:t>Define all expected behaviors under all expected conditions</a:t>
+            </a:r>
+          </a:p>
+          <a:p>
+            <a:r>
+              <a:rPr lang="en-US" sz="2400" dirty="0"/>
+              <a:t>Works best when domain is well-understood</a:t>
+            </a:r>
+          </a:p>
+        </p:txBody>
+      </p:sp>
+      <p:sp>
+        <p:nvSpPr>
+          <p:cNvPr id="33" name="Rectangle 32">
+            <a:extLst>
+              <a:ext uri="{FF2B5EF4-FFF2-40B4-BE49-F238E27FC236}">
+                <a16:creationId xmlns:a16="http://schemas.microsoft.com/office/drawing/2014/main" id="{2568BC19-F052-4108-93E1-6A3D1DEC072F}"/>
+              </a:ext>
+              <a:ext uri="{C183D7F6-B498-43B3-948B-1728B52AA6E4}">
+                <adec:decorative xmlns:adec="http://schemas.microsoft.com/office/drawing/2017/decorative" val="1"/>
+              </a:ext>
+            </a:extLst>
+          </p:cNvPr>
+          <p:cNvSpPr>
+            <a:spLocks noGrp="1" noRot="1" noChangeAspect="1" noMove="1" noResize="1" noEditPoints="1" noAdjustHandles="1" noChangeArrowheads="1" noChangeShapeType="1" noTextEdit="1"/>
+          </p:cNvSpPr>
+          <p:nvPr>
+            <p:extLst>
+              <p:ext uri="{386F3935-93C4-4BCD-93E2-E3B085C9AB24}">
+                <p16:designElem xmlns:p16="http://schemas.microsoft.com/office/powerpoint/2015/main" val="1"/>
+              </p:ext>
+            </p:extLst>
+          </p:nvPr>
+        </p:nvSpPr>
+        <p:spPr>
+          <a:xfrm>
+            <a:off x="494784" y="764424"/>
+            <a:ext cx="128016" cy="653903"/>
+          </a:xfrm>
+          <a:prstGeom prst="rect">
+            <a:avLst/>
+          </a:prstGeom>
           <a:solidFill>
             <a:schemeClr val="accent2"/>
           </a:solidFill>
-          <a:ln w="41275" cap="rnd">
-            <a:solidFill>
-              <a:schemeClr val="accent2"/>
-            </a:solidFill>
-            <a:round/>
-            <a:extLst>
-              <a:ext uri="{C807C97D-BFC1-408E-A445-0C87EB9F89A2}">
-                <ask:lineSketchStyleProps xmlns:ask="http://schemas.microsoft.com/office/drawing/2018/sketchyshapes" sd="1219033472">
-                  <a:prstGeom prst="rect">
-                    <a:avLst/>
-                  </a:prstGeom>
-                  <ask:type>
-                    <ask:lineSketchFreehand/>
-                  </ask:type>
-                </ask:lineSketchStyleProps>
-              </a:ext>
-            </a:extLst>
+          <a:ln>
+            <a:noFill/>
           </a:ln>
         </p:spPr>
         <p:style>
@@ -11105,46 +11273,130 @@
           <a:bodyPr rtlCol="0" anchor="ctr"/>
           <a:lstStyle/>
           <a:p>
-            <a:pPr algn="ctr"/>
-            <a:endParaRPr lang="en-US"/>
-          </a:p>
-        </p:txBody>
-      </p:sp>
-      <p:sp>
-        <p:nvSpPr>
-          <p:cNvPr id="3" name="Content Placeholder 2">
+            <a:pPr marL="0" marR="0" lvl="0" indent="0" algn="ctr" defTabSz="914400" rtl="0" eaLnBrk="1" fontAlgn="auto" latinLnBrk="0" hangingPunct="1">
+              <a:lnSpc>
+                <a:spcPct val="100000"/>
+              </a:lnSpc>
+              <a:spcBef>
+                <a:spcPts val="0"/>
+              </a:spcBef>
+              <a:spcAft>
+                <a:spcPts val="0"/>
+              </a:spcAft>
+              <a:buClrTx/>
+              <a:buSzTx/>
+              <a:buFontTx/>
+              <a:buNone/>
+              <a:tabLst/>
+              <a:defRPr/>
+            </a:pPr>
+            <a:endParaRPr kumimoji="0" lang="en-US" sz="1800" b="0" i="0" u="none" strike="noStrike" kern="1200" cap="none" spc="0" normalizeH="0" baseline="0" noProof="0">
+              <a:ln>
+                <a:noFill/>
+              </a:ln>
+              <a:solidFill>
+                <a:prstClr val="white"/>
+              </a:solidFill>
+              <a:effectLst/>
+              <a:uLnTx/>
+              <a:uFillTx/>
+              <a:latin typeface="Calibri" panose="020F0502020204030204"/>
+              <a:ea typeface="+mn-ea"/>
+              <a:cs typeface="+mn-cs"/>
+            </a:endParaRPr>
+          </a:p>
+        </p:txBody>
+      </p:sp>
+      <p:sp>
+        <p:nvSpPr>
+          <p:cNvPr id="35" name="Rectangle 34">
             <a:extLst>
               <a:ext uri="{FF2B5EF4-FFF2-40B4-BE49-F238E27FC236}">
-                <a16:creationId xmlns:a16="http://schemas.microsoft.com/office/drawing/2014/main" id="{E89FC48A-16C8-684B-A1DE-CE9B7D5AB066}"/>
+                <a16:creationId xmlns:a16="http://schemas.microsoft.com/office/drawing/2014/main" id="{D5FD337D-4D6B-4C8B-B6F5-121097E09881}"/>
+              </a:ext>
+              <a:ext uri="{C183D7F6-B498-43B3-948B-1728B52AA6E4}">
+                <adec:decorative xmlns:adec="http://schemas.microsoft.com/office/drawing/2017/decorative" val="1"/>
               </a:ext>
             </a:extLst>
           </p:cNvPr>
           <p:cNvSpPr>
-            <a:spLocks noGrp="1"/>
-          </p:cNvSpPr>
-          <p:nvPr>
-            <p:ph idx="1"/>
+            <a:spLocks noGrp="1" noRot="1" noChangeAspect="1" noMove="1" noResize="1" noEditPoints="1" noAdjustHandles="1" noChangeArrowheads="1" noChangeShapeType="1" noTextEdit="1"/>
+          </p:cNvSpPr>
+          <p:nvPr>
+            <p:extLst>
+              <p:ext uri="{386F3935-93C4-4BCD-93E2-E3B085C9AB24}">
+                <p16:designElem xmlns:p16="http://schemas.microsoft.com/office/powerpoint/2015/main" val="1"/>
+              </p:ext>
+            </p:extLst>
           </p:nvPr>
         </p:nvSpPr>
         <p:spPr>
-          <a:xfrm>
-            <a:off x="5541263" y="457200"/>
-            <a:ext cx="6007608" cy="1929384"/>
+          <a:xfrm rot="5400000">
+            <a:off x="5586984" y="1071836"/>
+            <a:ext cx="1021458" cy="9144"/>
           </a:xfrm>
+          <a:prstGeom prst="rect">
+            <a:avLst/>
+          </a:prstGeom>
+          <a:solidFill>
+            <a:srgbClr val="D5D5D5"/>
+          </a:solidFill>
+          <a:ln w="3175">
+            <a:noFill/>
+          </a:ln>
+          <a:effectLst/>
         </p:spPr>
-        <p:txBody>
-          <a:bodyPr anchor="ctr">
-            <a:normAutofit/>
-          </a:bodyPr>
+        <p:style>
+          <a:lnRef idx="2">
+            <a:schemeClr val="accent1">
+              <a:shade val="50000"/>
+            </a:schemeClr>
+          </a:lnRef>
+          <a:fillRef idx="1">
+            <a:schemeClr val="accent1"/>
+          </a:fillRef>
+          <a:effectRef idx="0">
+            <a:schemeClr val="accent1"/>
+          </a:effectRef>
+          <a:fontRef idx="minor">
+            <a:schemeClr val="lt1"/>
+          </a:fontRef>
+        </p:style>
+        <p:txBody>
+          <a:bodyPr rtlCol="0" anchor="ctr"/>
           <a:lstStyle/>
           <a:p>
-            <a:pPr marL="0" indent="0">
+            <a:pPr marL="0" marR="0" lvl="0" indent="0" algn="ctr" defTabSz="914400" rtl="0" eaLnBrk="1" fontAlgn="auto" latinLnBrk="0" hangingPunct="1">
+              <a:lnSpc>
+                <a:spcPct val="100000"/>
+              </a:lnSpc>
+              <a:spcBef>
+                <a:spcPts val="0"/>
+              </a:spcBef>
+              <a:spcAft>
+                <a:spcPts val="0"/>
+              </a:spcAft>
+              <a:buClrTx/>
+              <a:buSzTx/>
+              <a:buFontTx/>
               <a:buNone/>
+              <a:tabLst/>
+              <a:defRPr/>
             </a:pPr>
-            <a:r>
-              <a:rPr lang="en-US" sz="2200" dirty="0"/>
-              <a:t>Define all expected behaviors under all expected conditions</a:t>
-            </a:r>
+            <a:endParaRPr kumimoji="0" lang="en-US" sz="1800" b="0" i="0" u="none" strike="noStrike" kern="1200" cap="none" spc="0" normalizeH="0" baseline="0" noProof="0">
+              <a:ln>
+                <a:noFill/>
+              </a:ln>
+              <a:solidFill>
+                <a:prstClr val="white"/>
+              </a:solidFill>
+              <a:effectLst/>
+              <a:uLnTx/>
+              <a:uFillTx/>
+              <a:latin typeface="Calibri" panose="020F0502020204030204"/>
+              <a:ea typeface="+mn-ea"/>
+              <a:cs typeface="+mn-cs"/>
+            </a:endParaRPr>
           </a:p>
         </p:txBody>
       </p:sp>
@@ -11170,14 +11422,44 @@
         </p:blipFill>
         <p:spPr>
           <a:xfrm>
-            <a:off x="1063442" y="2386584"/>
-            <a:ext cx="3478388" cy="4502769"/>
+            <a:off x="1640166" y="2091095"/>
+            <a:ext cx="3249320" cy="4206240"/>
           </a:xfrm>
           <a:prstGeom prst="rect">
             <a:avLst/>
           </a:prstGeom>
         </p:spPr>
       </p:pic>
+      <p:pic>
+        <p:nvPicPr>
+          <p:cNvPr id="8" name="Picture 7">
+            <a:extLst>
+              <a:ext uri="{FF2B5EF4-FFF2-40B4-BE49-F238E27FC236}">
+                <a16:creationId xmlns:a16="http://schemas.microsoft.com/office/drawing/2014/main" id="{8B275341-2189-EB4C-ACE5-C3C82F9D918B}"/>
+              </a:ext>
+            </a:extLst>
+          </p:cNvPr>
+          <p:cNvPicPr>
+            <a:picLocks noChangeAspect="1"/>
+          </p:cNvPicPr>
+          <p:nvPr/>
+        </p:nvPicPr>
+        <p:blipFill>
+          <a:blip r:embed="rId4"/>
+          <a:stretch>
+            <a:fillRect/>
+          </a:stretch>
+        </p:blipFill>
+        <p:spPr>
+          <a:xfrm>
+            <a:off x="6516723" y="2086081"/>
+            <a:ext cx="4820906" cy="4206240"/>
+          </a:xfrm>
+          <a:prstGeom prst="rect">
+            <a:avLst/>
+          </a:prstGeom>
+        </p:spPr>
+      </p:pic>
       <p:sp>
         <p:nvSpPr>
           <p:cNvPr id="4" name="Slide Number Placeholder 3">
@@ -11197,11 +11479,11 @@
         <p:spPr>
           <a:xfrm>
             <a:off x="8610600" y="6356350"/>
-            <a:ext cx="2743200" cy="365125"/>
+            <a:ext cx="2712720" cy="365125"/>
           </a:xfrm>
         </p:spPr>
         <p:txBody>
-          <a:bodyPr>
+          <a:bodyPr vert="horz" lIns="91440" tIns="45720" rIns="91440" bIns="45720" rtlCol="0" anchor="ctr">
             <a:normAutofit/>
           </a:bodyPr>
           <a:lstStyle/>
@@ -11212,15 +11494,29 @@
               </a:spcAft>
             </a:pPr>
             <a:fld id="{20F37917-FD3A-4669-9018-DA04BCDD3D75}" type="slidenum">
-              <a:rPr lang="en-US"/>
+              <a:rPr lang="en-US">
+                <a:solidFill>
+                  <a:schemeClr val="tx1">
+                    <a:lumMod val="50000"/>
+                    <a:lumOff val="50000"/>
+                  </a:schemeClr>
+                </a:solidFill>
+              </a:rPr>
               <a:pPr>
                 <a:spcAft>
                   <a:spcPts val="600"/>
                 </a:spcAft>
               </a:pPr>
-              <a:t>10</a:t>
+              <a:t>11</a:t>
             </a:fld>
-            <a:endParaRPr lang="en-US"/>
+            <a:endParaRPr lang="en-US">
+              <a:solidFill>
+                <a:schemeClr val="tx1">
+                  <a:lumMod val="50000"/>
+                  <a:lumOff val="50000"/>
+                </a:schemeClr>
+              </a:solidFill>
+            </a:endParaRPr>
           </a:p>
         </p:txBody>
       </p:sp>
@@ -11283,36 +11579,6 @@
           </a:p>
         </p:txBody>
       </p:sp>
-      <p:pic>
-        <p:nvPicPr>
-          <p:cNvPr id="8" name="Picture 7">
-            <a:extLst>
-              <a:ext uri="{FF2B5EF4-FFF2-40B4-BE49-F238E27FC236}">
-                <a16:creationId xmlns:a16="http://schemas.microsoft.com/office/drawing/2014/main" id="{8B275341-2189-EB4C-ACE5-C3C82F9D918B}"/>
-              </a:ext>
-            </a:extLst>
-          </p:cNvPr>
-          <p:cNvPicPr>
-            <a:picLocks noChangeAspect="1"/>
-          </p:cNvPicPr>
-          <p:nvPr/>
-        </p:nvPicPr>
-        <p:blipFill>
-          <a:blip r:embed="rId4"/>
-          <a:stretch>
-            <a:fillRect/>
-          </a:stretch>
-        </p:blipFill>
-        <p:spPr>
-          <a:xfrm>
-            <a:off x="5497898" y="2199132"/>
-            <a:ext cx="6094337" cy="5310632"/>
-          </a:xfrm>
-          <a:prstGeom prst="rect">
-            <a:avLst/>
-          </a:prstGeom>
-        </p:spPr>
-      </p:pic>
     </p:spTree>
     <p:extLst>
       <p:ext uri="{BB962C8B-B14F-4D97-AF65-F5344CB8AC3E}">
@@ -11326,7 +11592,7 @@
 </p:sld>
 </file>
 
-<file path=ppt/slides/slide11.xml><?xml version="1.0" encoding="utf-8"?>
+<file path=ppt/slides/slide12.xml><?xml version="1.0" encoding="utf-8"?>
 <p:sld xmlns:a="http://schemas.openxmlformats.org/drawingml/2006/main" xmlns:r="http://schemas.openxmlformats.org/officeDocument/2006/relationships" xmlns:p="http://schemas.openxmlformats.org/presentationml/2006/main">
   <p:cSld>
     <p:spTree>
@@ -11361,40 +11627,50 @@
         </p:nvSpPr>
         <p:spPr/>
         <p:txBody>
+          <a:bodyPr>
+            <a:normAutofit fontScale="90000"/>
+          </a:bodyPr>
+          <a:lstStyle/>
+          <a:p>
+            <a:r>
+              <a:rPr lang="en-US" dirty="0"/>
+              <a:t>User Stories can document requirements from a </a:t>
+            </a:r>
+            <a:r>
+              <a:rPr lang="en-US" i="1" dirty="0"/>
+              <a:t>user’s</a:t>
+            </a:r>
+            <a:r>
+              <a:rPr lang="en-US" dirty="0"/>
+              <a:t> point of view</a:t>
+            </a:r>
+          </a:p>
+        </p:txBody>
+      </p:sp>
+      <p:sp>
+        <p:nvSpPr>
+          <p:cNvPr id="4" name="Slide Number Placeholder 3">
+            <a:extLst>
+              <a:ext uri="{FF2B5EF4-FFF2-40B4-BE49-F238E27FC236}">
+                <a16:creationId xmlns:a16="http://schemas.microsoft.com/office/drawing/2014/main" id="{EB6258F6-2673-A748-BCFD-B5E43D7D4D9E}"/>
+              </a:ext>
+            </a:extLst>
+          </p:cNvPr>
+          <p:cNvSpPr>
+            <a:spLocks noGrp="1"/>
+          </p:cNvSpPr>
+          <p:nvPr>
+            <p:ph type="sldNum" sz="quarter" idx="12"/>
+          </p:nvPr>
+        </p:nvSpPr>
+        <p:spPr/>
+        <p:txBody>
           <a:bodyPr/>
           <a:lstStyle/>
           <a:p>
-            <a:r>
-              <a:rPr lang="en-US" dirty="0"/>
-              <a:t>Documenting Requirements: User Stories</a:t>
-            </a:r>
-          </a:p>
-        </p:txBody>
-      </p:sp>
-      <p:sp>
-        <p:nvSpPr>
-          <p:cNvPr id="4" name="Slide Number Placeholder 3">
-            <a:extLst>
-              <a:ext uri="{FF2B5EF4-FFF2-40B4-BE49-F238E27FC236}">
-                <a16:creationId xmlns:a16="http://schemas.microsoft.com/office/drawing/2014/main" id="{EB6258F6-2673-A748-BCFD-B5E43D7D4D9E}"/>
-              </a:ext>
-            </a:extLst>
-          </p:cNvPr>
-          <p:cNvSpPr>
-            <a:spLocks noGrp="1"/>
-          </p:cNvSpPr>
-          <p:nvPr>
-            <p:ph type="sldNum" sz="quarter" idx="12"/>
-          </p:nvPr>
-        </p:nvSpPr>
-        <p:spPr/>
-        <p:txBody>
-          <a:bodyPr/>
-          <a:lstStyle/>
-          <a:p>
             <a:fld id="{20F37917-FD3A-4669-9018-DA04BCDD3D75}" type="slidenum">
               <a:rPr lang="en-US" smtClean="0"/>
-              <a:t>11</a:t>
+              <a:t>12</a:t>
             </a:fld>
             <a:endParaRPr lang="en-US"/>
           </a:p>
@@ -11414,7 +11690,7 @@
         </p:nvSpPr>
         <p:spPr>
           <a:xfrm>
-            <a:off x="838200" y="2978690"/>
+            <a:off x="838200" y="2743720"/>
             <a:ext cx="5271206" cy="1077218"/>
           </a:xfrm>
           <a:prstGeom prst="rect">
@@ -11517,7 +11793,7 @@
                   <a:schemeClr val="tx1"/>
                 </a:solidFill>
               </a:rPr>
-              <a:t>Specifying what should happen, for who, and why</a:t>
+              <a:t>Specifying what should happen, for whom, and why</a:t>
             </a:r>
           </a:p>
         </p:txBody>
@@ -11569,6 +11845,77 @@
           </a:extLst>
         </p:spPr>
       </p:pic>
+      <p:sp>
+        <p:nvSpPr>
+          <p:cNvPr id="8" name="TextBox 7">
+            <a:extLst>
+              <a:ext uri="{FF2B5EF4-FFF2-40B4-BE49-F238E27FC236}">
+                <a16:creationId xmlns:a16="http://schemas.microsoft.com/office/drawing/2014/main" id="{B6C9B03B-D56E-2644-A031-AC686A4878D2}"/>
+              </a:ext>
+            </a:extLst>
+          </p:cNvPr>
+          <p:cNvSpPr txBox="1"/>
+          <p:nvPr/>
+        </p:nvSpPr>
+        <p:spPr>
+          <a:xfrm>
+            <a:off x="838200" y="4293340"/>
+            <a:ext cx="5271206" cy="1815882"/>
+          </a:xfrm>
+          <a:prstGeom prst="rect">
+            <a:avLst/>
+          </a:prstGeom>
+          <a:noFill/>
+          <a:ln w="12700" cap="flat" cmpd="sng" algn="ctr">
+            <a:noFill/>
+            <a:prstDash val="solid"/>
+            <a:miter lim="800000"/>
+          </a:ln>
+          <a:effectLst/>
+        </p:spPr>
+        <p:style>
+          <a:lnRef idx="2">
+            <a:schemeClr val="accent1">
+              <a:shade val="50000"/>
+            </a:schemeClr>
+          </a:lnRef>
+          <a:fillRef idx="1">
+            <a:schemeClr val="accent1"/>
+          </a:fillRef>
+          <a:effectRef idx="0">
+            <a:schemeClr val="accent1"/>
+          </a:effectRef>
+          <a:fontRef idx="minor">
+            <a:schemeClr val="lt1"/>
+          </a:fontRef>
+        </p:style>
+        <p:txBody>
+          <a:bodyPr wrap="square">
+            <a:spAutoFit/>
+          </a:bodyPr>
+          <a:lstStyle/>
+          <a:p>
+            <a:r>
+              <a:rPr lang="en-US" sz="2800" dirty="0">
+                <a:solidFill>
+                  <a:schemeClr val="tx1"/>
+                </a:solidFill>
+              </a:rPr>
+              <a:t>Conditions of Satisfaction:</a:t>
+            </a:r>
+          </a:p>
+          <a:p>
+            <a:r>
+              <a:rPr lang="en-US" sz="2800" dirty="0">
+                <a:solidFill>
+                  <a:schemeClr val="tx1"/>
+                </a:solidFill>
+              </a:rPr>
+              <a:t>Given &lt;interaction with software, state of environment&gt;, I expect &lt;behavior and side effects&gt;</a:t>
+            </a:r>
+          </a:p>
+        </p:txBody>
+      </p:sp>
     </p:spTree>
     <p:extLst>
       <p:ext uri="{BB962C8B-B14F-4D97-AF65-F5344CB8AC3E}">
@@ -11582,7 +11929,7 @@
 </p:sld>
 </file>
 
-<file path=ppt/slides/slide12.xml><?xml version="1.0" encoding="utf-8"?>
+<file path=ppt/slides/slide13.xml><?xml version="1.0" encoding="utf-8"?>
 <p:sld xmlns:a="http://schemas.openxmlformats.org/drawingml/2006/main" xmlns:r="http://schemas.openxmlformats.org/officeDocument/2006/relationships" xmlns:p="http://schemas.openxmlformats.org/presentationml/2006/main">
   <p:cSld>
     <p:spTree>
@@ -11708,7 +12055,7 @@
           <a:p>
             <a:fld id="{20F37917-FD3A-4669-9018-DA04BCDD3D75}" type="slidenum">
               <a:rPr lang="en-US" smtClean="0"/>
-              <a:t>12</a:t>
+              <a:t>13</a:t>
             </a:fld>
             <a:endParaRPr lang="en-US"/>
           </a:p>
@@ -11788,7 +12135,7 @@
 </p:sld>
 </file>
 
-<file path=ppt/slides/slide13.xml><?xml version="1.0" encoding="utf-8"?>
+<file path=ppt/slides/slide14.xml><?xml version="1.0" encoding="utf-8"?>
 <p:sld xmlns:a="http://schemas.openxmlformats.org/drawingml/2006/main" xmlns:r="http://schemas.openxmlformats.org/officeDocument/2006/relationships" xmlns:p="http://schemas.openxmlformats.org/presentationml/2006/main">
   <p:cSld>
     <p:spTree>
@@ -11856,7 +12203,7 @@
           <a:p>
             <a:fld id="{20F37917-FD3A-4669-9018-DA04BCDD3D75}" type="slidenum">
               <a:rPr lang="en-US" smtClean="0"/>
-              <a:t>13</a:t>
+              <a:t>14</a:t>
             </a:fld>
             <a:endParaRPr lang="en-US"/>
           </a:p>
@@ -12164,160 +12511,6 @@
 </p:sld>
 </file>
 
-<file path=ppt/slides/slide14.xml><?xml version="1.0" encoding="utf-8"?>
-<p:sld xmlns:a="http://schemas.openxmlformats.org/drawingml/2006/main" xmlns:r="http://schemas.openxmlformats.org/officeDocument/2006/relationships" xmlns:p="http://schemas.openxmlformats.org/presentationml/2006/main">
-  <p:cSld>
-    <p:spTree>
-      <p:nvGrpSpPr>
-        <p:cNvPr id="1" name=""/>
-        <p:cNvGrpSpPr/>
-        <p:nvPr/>
-      </p:nvGrpSpPr>
-      <p:grpSpPr>
-        <a:xfrm>
-          <a:off x="0" y="0"/>
-          <a:ext cx="0" cy="0"/>
-          <a:chOff x="0" y="0"/>
-          <a:chExt cx="0" cy="0"/>
-        </a:xfrm>
-      </p:grpSpPr>
-      <p:sp>
-        <p:nvSpPr>
-          <p:cNvPr id="2" name="Title 1">
-            <a:extLst>
-              <a:ext uri="{FF2B5EF4-FFF2-40B4-BE49-F238E27FC236}">
-                <a16:creationId xmlns:a16="http://schemas.microsoft.com/office/drawing/2014/main" id="{C2DE79C1-5AB5-8040-9F6A-9C0389FE1DBA}"/>
-              </a:ext>
-            </a:extLst>
-          </p:cNvPr>
-          <p:cNvSpPr>
-            <a:spLocks noGrp="1"/>
-          </p:cNvSpPr>
-          <p:nvPr>
-            <p:ph type="title"/>
-          </p:nvPr>
-        </p:nvSpPr>
-        <p:spPr/>
-        <p:txBody>
-          <a:bodyPr/>
-          <a:lstStyle/>
-          <a:p>
-            <a:r>
-              <a:rPr lang="en-US" dirty="0"/>
-              <a:t>User Stories: Conditions of Satisfaction</a:t>
-            </a:r>
-          </a:p>
-        </p:txBody>
-      </p:sp>
-      <p:sp>
-        <p:nvSpPr>
-          <p:cNvPr id="3" name="Content Placeholder 2">
-            <a:extLst>
-              <a:ext uri="{FF2B5EF4-FFF2-40B4-BE49-F238E27FC236}">
-                <a16:creationId xmlns:a16="http://schemas.microsoft.com/office/drawing/2014/main" id="{34D3B817-F974-FA4D-8F92-DB80E73C89ED}"/>
-              </a:ext>
-            </a:extLst>
-          </p:cNvPr>
-          <p:cNvSpPr>
-            <a:spLocks noGrp="1"/>
-          </p:cNvSpPr>
-          <p:nvPr>
-            <p:ph sz="half" idx="1"/>
-          </p:nvPr>
-        </p:nvSpPr>
-        <p:spPr>
-          <a:xfrm>
-            <a:off x="838200" y="1825625"/>
-            <a:ext cx="10515600" cy="4351338"/>
-          </a:xfrm>
-        </p:spPr>
-        <p:txBody>
-          <a:bodyPr/>
-          <a:lstStyle/>
-          <a:p>
-            <a:r>
-              <a:rPr lang="en-US" dirty="0"/>
-              <a:t>How do we know if we have satisfied the user? Lots of detail doesn’t fit onto 3x5 card:</a:t>
-            </a:r>
-          </a:p>
-          <a:p>
-            <a:pPr lvl="1"/>
-            <a:r>
-              <a:rPr lang="en-US" dirty="0"/>
-              <a:t>Where do backups get saved?</a:t>
-            </a:r>
-          </a:p>
-          <a:p>
-            <a:pPr lvl="1"/>
-            <a:r>
-              <a:rPr lang="en-US" dirty="0"/>
-              <a:t>What if backup system is unavailable?</a:t>
-            </a:r>
-          </a:p>
-          <a:p>
-            <a:pPr lvl="1"/>
-            <a:r>
-              <a:rPr lang="en-US" dirty="0"/>
-              <a:t>What if backup system is full?</a:t>
-            </a:r>
-          </a:p>
-          <a:p>
-            <a:pPr lvl="1"/>
-            <a:r>
-              <a:rPr lang="en-US" dirty="0"/>
-              <a:t>Do backups ever get rotated/deleted?</a:t>
-            </a:r>
-          </a:p>
-          <a:p>
-            <a:r>
-              <a:rPr lang="en-US" dirty="0"/>
-              <a:t>Conditions of satisfaction are a list of common cases and special cases that must work</a:t>
-            </a:r>
-          </a:p>
-        </p:txBody>
-      </p:sp>
-      <p:sp>
-        <p:nvSpPr>
-          <p:cNvPr id="4" name="Slide Number Placeholder 3">
-            <a:extLst>
-              <a:ext uri="{FF2B5EF4-FFF2-40B4-BE49-F238E27FC236}">
-                <a16:creationId xmlns:a16="http://schemas.microsoft.com/office/drawing/2014/main" id="{EB6258F6-2673-A748-BCFD-B5E43D7D4D9E}"/>
-              </a:ext>
-            </a:extLst>
-          </p:cNvPr>
-          <p:cNvSpPr>
-            <a:spLocks noGrp="1"/>
-          </p:cNvSpPr>
-          <p:nvPr>
-            <p:ph type="sldNum" sz="quarter" idx="12"/>
-          </p:nvPr>
-        </p:nvSpPr>
-        <p:spPr/>
-        <p:txBody>
-          <a:bodyPr/>
-          <a:lstStyle/>
-          <a:p>
-            <a:fld id="{20F37917-FD3A-4669-9018-DA04BCDD3D75}" type="slidenum">
-              <a:rPr lang="en-US" smtClean="0"/>
-              <a:t>14</a:t>
-            </a:fld>
-            <a:endParaRPr lang="en-US"/>
-          </a:p>
-        </p:txBody>
-      </p:sp>
-    </p:spTree>
-    <p:extLst>
-      <p:ext uri="{BB962C8B-B14F-4D97-AF65-F5344CB8AC3E}">
-        <p14:creationId xmlns:p14="http://schemas.microsoft.com/office/powerpoint/2010/main" val="547370405"/>
-      </p:ext>
-    </p:extLst>
-  </p:cSld>
-  <p:clrMapOvr>
-    <a:masterClrMapping/>
-  </p:clrMapOvr>
-</p:sld>
-</file>
-
 <file path=ppt/slides/slide15.xml><?xml version="1.0" encoding="utf-8"?>
 <p:sld xmlns:a="http://schemas.openxmlformats.org/drawingml/2006/main" xmlns:r="http://schemas.openxmlformats.org/officeDocument/2006/relationships" xmlns:p="http://schemas.openxmlformats.org/presentationml/2006/main">
   <p:cSld>
@@ -12340,7 +12533,7 @@
           <p:cNvPr id="2" name="Title 1">
             <a:extLst>
               <a:ext uri="{FF2B5EF4-FFF2-40B4-BE49-F238E27FC236}">
-                <a16:creationId xmlns:a16="http://schemas.microsoft.com/office/drawing/2014/main" id="{1D1A0EE3-B568-5449-9113-14FAA57F43C7}"/>
+                <a16:creationId xmlns:a16="http://schemas.microsoft.com/office/drawing/2014/main" id="{C2DE79C1-5AB5-8040-9F6A-9C0389FE1DBA}"/>
               </a:ext>
             </a:extLst>
           </p:cNvPr>
@@ -12368,7 +12561,7 @@
           <p:cNvPr id="3" name="Content Placeholder 2">
             <a:extLst>
               <a:ext uri="{FF2B5EF4-FFF2-40B4-BE49-F238E27FC236}">
-                <a16:creationId xmlns:a16="http://schemas.microsoft.com/office/drawing/2014/main" id="{BA47FD3B-0CCF-E74C-BEAA-A6EB69823A43}"/>
+                <a16:creationId xmlns:a16="http://schemas.microsoft.com/office/drawing/2014/main" id="{34D3B817-F974-FA4D-8F92-DB80E73C89ED}"/>
               </a:ext>
             </a:extLst>
           </p:cNvPr>
@@ -12382,7 +12575,7 @@
         <p:spPr>
           <a:xfrm>
             <a:off x="838200" y="1825625"/>
-            <a:ext cx="9982200" cy="4351338"/>
+            <a:ext cx="10515600" cy="4351338"/>
           </a:xfrm>
         </p:spPr>
         <p:txBody>
@@ -12391,68 +12584,51 @@
           <a:p>
             <a:r>
               <a:rPr lang="en-US" dirty="0"/>
-              <a:t>“As a t</a:t>
-            </a:r>
-            <a:r>
-              <a:rPr lang="en-US" u="sng" dirty="0"/>
-              <a:t>ypical computer user</a:t>
-            </a:r>
-            <a:r>
-              <a:rPr lang="en-US" dirty="0"/>
-              <a:t>, I want to </a:t>
-            </a:r>
-            <a:r>
-              <a:rPr lang="en-US" u="sng" dirty="0"/>
-              <a:t>specify folders to backup</a:t>
-            </a:r>
-            <a:r>
-              <a:rPr lang="en-US" dirty="0"/>
-              <a:t>, so that </a:t>
-            </a:r>
-            <a:r>
-              <a:rPr lang="en-US" u="sng" dirty="0"/>
-              <a:t>my most important files are safe</a:t>
-            </a:r>
-            <a:r>
-              <a:rPr lang="en-US" dirty="0"/>
-              <a:t>”</a:t>
-            </a:r>
-          </a:p>
-          <a:p>
-            <a:r>
-              <a:rPr lang="en-US" dirty="0"/>
-              <a:t>My conditions of satisfaction are:</a:t>
+              <a:t>How do we know if we have satisfied the user? Lots of detail doesn’t fit onto 3x5 card:</a:t>
             </a:r>
           </a:p>
           <a:p>
             <a:pPr lvl="1"/>
             <a:r>
               <a:rPr lang="en-US" dirty="0"/>
-              <a:t>If the network and remote backup service are available, and I am not over my storage quota, the backup should be successful.</a:t>
+              <a:t>Where do backups get saved?</a:t>
             </a:r>
           </a:p>
           <a:p>
             <a:pPr lvl="1"/>
             <a:r>
               <a:rPr lang="en-US" dirty="0"/>
-              <a:t>After successfully running, an updated copy of each of the files that I have requested to be backed up are stored in a redundant, cloud filesystem</a:t>
+              <a:t>What if backup system is unavailable?</a:t>
             </a:r>
           </a:p>
           <a:p>
             <a:pPr lvl="1"/>
             <a:r>
               <a:rPr lang="en-US" dirty="0"/>
-              <a:t>If a backup is not successful, an error message is prominently displayed indicating the cause of failure to be in the software, the network, the remote backup storage, or other</a:t>
-            </a:r>
-          </a:p>
-        </p:txBody>
-      </p:sp>
-      <p:sp>
-        <p:nvSpPr>
-          <p:cNvPr id="5" name="Slide Number Placeholder 4">
+              <a:t>What if backup system is full?</a:t>
+            </a:r>
+          </a:p>
+          <a:p>
+            <a:pPr lvl="1"/>
+            <a:r>
+              <a:rPr lang="en-US" dirty="0"/>
+              <a:t>Do backups ever get rotated/deleted?</a:t>
+            </a:r>
+          </a:p>
+          <a:p>
+            <a:r>
+              <a:rPr lang="en-US" dirty="0"/>
+              <a:t>Conditions of satisfaction are a list of common cases and special cases that must work</a:t>
+            </a:r>
+          </a:p>
+        </p:txBody>
+      </p:sp>
+      <p:sp>
+        <p:nvSpPr>
+          <p:cNvPr id="4" name="Slide Number Placeholder 3">
             <a:extLst>
               <a:ext uri="{FF2B5EF4-FFF2-40B4-BE49-F238E27FC236}">
-                <a16:creationId xmlns:a16="http://schemas.microsoft.com/office/drawing/2014/main" id="{735C1EAC-F071-1843-9A3A-04DC5304ACC7}"/>
+                <a16:creationId xmlns:a16="http://schemas.microsoft.com/office/drawing/2014/main" id="{EB6258F6-2673-A748-BCFD-B5E43D7D4D9E}"/>
               </a:ext>
             </a:extLst>
           </p:cNvPr>
@@ -12479,7 +12655,7 @@
     </p:spTree>
     <p:extLst>
       <p:ext uri="{BB962C8B-B14F-4D97-AF65-F5344CB8AC3E}">
-        <p14:creationId xmlns:p14="http://schemas.microsoft.com/office/powerpoint/2010/main" val="2121797437"/>
+        <p14:creationId xmlns:p14="http://schemas.microsoft.com/office/powerpoint/2010/main" val="547370405"/>
       </p:ext>
     </p:extLst>
   </p:cSld>
@@ -12511,7 +12687,7 @@
           <p:cNvPr id="2" name="Title 1">
             <a:extLst>
               <a:ext uri="{FF2B5EF4-FFF2-40B4-BE49-F238E27FC236}">
-                <a16:creationId xmlns:a16="http://schemas.microsoft.com/office/drawing/2014/main" id="{16F86D58-152F-496B-BA81-FDA5B100832A}"/>
+                <a16:creationId xmlns:a16="http://schemas.microsoft.com/office/drawing/2014/main" id="{1D1A0EE3-B568-5449-9113-14FAA57F43C7}"/>
               </a:ext>
             </a:extLst>
           </p:cNvPr>
@@ -12529,7 +12705,7 @@
           <a:p>
             <a:r>
               <a:rPr lang="en-US" dirty="0"/>
-              <a:t>Non-Functional Requirements: Backup Software</a:t>
+              <a:t>Conditions of Satisfaction: Backup Software</a:t>
             </a:r>
           </a:p>
         </p:txBody>
@@ -12539,7 +12715,7 @@
           <p:cNvPr id="3" name="Content Placeholder 2">
             <a:extLst>
               <a:ext uri="{FF2B5EF4-FFF2-40B4-BE49-F238E27FC236}">
-                <a16:creationId xmlns:a16="http://schemas.microsoft.com/office/drawing/2014/main" id="{E9F968A6-CC31-4AE6-83F3-85021744E177}"/>
+                <a16:creationId xmlns:a16="http://schemas.microsoft.com/office/drawing/2014/main" id="{BA47FD3B-0CCF-E74C-BEAA-A6EB69823A43}"/>
               </a:ext>
             </a:extLst>
           </p:cNvPr>
@@ -12547,13 +12723,13 @@
             <a:spLocks noGrp="1"/>
           </p:cNvSpPr>
           <p:nvPr>
-            <p:ph idx="1"/>
+            <p:ph sz="half" idx="1"/>
           </p:nvPr>
         </p:nvSpPr>
         <p:spPr>
           <a:xfrm>
-            <a:off x="838200" y="1500160"/>
-            <a:ext cx="10515600" cy="4351338"/>
+            <a:off x="838200" y="1825625"/>
+            <a:ext cx="9982200" cy="4351338"/>
           </a:xfrm>
         </p:spPr>
         <p:txBody>
@@ -12562,45 +12738,68 @@
           <a:p>
             <a:r>
               <a:rPr lang="en-US" dirty="0"/>
-              <a:t>Does “After successfully running, an updated copy of each of the files that I have requested to be backed up are stored in a redundant, cloud filesystem” guarantee success?</a:t>
+              <a:t>“As a t</a:t>
+            </a:r>
+            <a:r>
+              <a:rPr lang="en-US" u="sng" dirty="0"/>
+              <a:t>ypical computer user</a:t>
+            </a:r>
+            <a:r>
+              <a:rPr lang="en-US" dirty="0"/>
+              <a:t>, I want to </a:t>
+            </a:r>
+            <a:r>
+              <a:rPr lang="en-US" u="sng" dirty="0"/>
+              <a:t>specify folders to backup</a:t>
+            </a:r>
+            <a:r>
+              <a:rPr lang="en-US" dirty="0"/>
+              <a:t>, so that </a:t>
+            </a:r>
+            <a:r>
+              <a:rPr lang="en-US" u="sng" dirty="0"/>
+              <a:t>my most important files are safe</a:t>
+            </a:r>
+            <a:r>
+              <a:rPr lang="en-US" dirty="0"/>
+              <a:t>”</a:t>
+            </a:r>
+          </a:p>
+          <a:p>
+            <a:r>
+              <a:rPr lang="en-US" dirty="0"/>
+              <a:t>My conditions of satisfaction are:</a:t>
             </a:r>
           </a:p>
           <a:p>
             <a:pPr lvl="1"/>
             <a:r>
               <a:rPr lang="en-US" dirty="0"/>
-              <a:t>What was the transfer speed? (Performance)</a:t>
+              <a:t>If the network and remote backup service are available, and I am not over my storage quota, the backup should be successful.</a:t>
             </a:r>
           </a:p>
           <a:p>
             <a:pPr lvl="1"/>
             <a:r>
               <a:rPr lang="en-US" dirty="0"/>
-              <a:t>How much temporary disk space did it use to create the backup? (Performance)</a:t>
+              <a:t>After successfully running, an updated copy of each of the files that I have requested to be backed up are stored in a redundant, cloud filesystem</a:t>
             </a:r>
           </a:p>
           <a:p>
             <a:pPr lvl="1"/>
             <a:r>
               <a:rPr lang="en-US" dirty="0"/>
-              <a:t>How long did I spend on the phone with support to set up the software? (Usability)</a:t>
-            </a:r>
-          </a:p>
-          <a:p>
-            <a:pPr lvl="1"/>
-            <a:r>
-              <a:rPr lang="en-US" dirty="0"/>
-              <a:t>Are my files encrypted, or access controlled at all? (Security)</a:t>
-            </a:r>
-          </a:p>
-        </p:txBody>
-      </p:sp>
-      <p:sp>
-        <p:nvSpPr>
-          <p:cNvPr id="4" name="Slide Number Placeholder 3">
+              <a:t>If a backup is not successful, an error message is prominently displayed indicating the cause of failure to be in the software, the network, the remote backup storage, or other</a:t>
+            </a:r>
+          </a:p>
+        </p:txBody>
+      </p:sp>
+      <p:sp>
+        <p:nvSpPr>
+          <p:cNvPr id="5" name="Slide Number Placeholder 4">
             <a:extLst>
               <a:ext uri="{FF2B5EF4-FFF2-40B4-BE49-F238E27FC236}">
-                <a16:creationId xmlns:a16="http://schemas.microsoft.com/office/drawing/2014/main" id="{C7C3DEB3-F948-4B7E-8BDA-FB7ABCF7A993}"/>
+                <a16:creationId xmlns:a16="http://schemas.microsoft.com/office/drawing/2014/main" id="{735C1EAC-F071-1843-9A3A-04DC5304ACC7}"/>
               </a:ext>
             </a:extLst>
           </p:cNvPr>
@@ -12627,7 +12826,7 @@
     </p:spTree>
     <p:extLst>
       <p:ext uri="{BB962C8B-B14F-4D97-AF65-F5344CB8AC3E}">
-        <p14:creationId xmlns:p14="http://schemas.microsoft.com/office/powerpoint/2010/main" val="3635116464"/>
+        <p14:creationId xmlns:p14="http://schemas.microsoft.com/office/powerpoint/2010/main" val="2121797437"/>
       </p:ext>
     </p:extLst>
   </p:cSld>
@@ -12677,7 +12876,7 @@
           <a:p>
             <a:r>
               <a:rPr lang="en-US" dirty="0"/>
-              <a:t>Common Non-Functional Requirements</a:t>
+              <a:t>Non-Functional Requirements: Backup Software</a:t>
             </a:r>
           </a:p>
         </p:txBody>
@@ -12705,90 +12904,40 @@
           </a:xfrm>
         </p:spPr>
         <p:txBody>
-          <a:bodyPr>
-            <a:normAutofit fontScale="92500" lnSpcReduction="20000"/>
-          </a:bodyPr>
+          <a:bodyPr/>
           <a:lstStyle/>
           <a:p>
             <a:r>
               <a:rPr lang="en-US" dirty="0"/>
-              <a:t>Qualities that reflect the execution of the system</a:t>
+              <a:t>Does “After successfully running, an updated copy of each of the files that I have requested to be backed up are stored in a redundant, cloud filesystem” guarantee success?</a:t>
             </a:r>
           </a:p>
           <a:p>
             <a:pPr lvl="1"/>
             <a:r>
               <a:rPr lang="en-US" dirty="0"/>
-              <a:t>Accessibility</a:t>
+              <a:t>What was the transfer speed? (Performance)</a:t>
             </a:r>
           </a:p>
           <a:p>
             <a:pPr lvl="1"/>
             <a:r>
               <a:rPr lang="en-US" dirty="0"/>
-              <a:t>Availability</a:t>
+              <a:t>How much temporary disk space did it use to create the backup? (Performance)</a:t>
             </a:r>
           </a:p>
           <a:p>
             <a:pPr lvl="1"/>
             <a:r>
               <a:rPr lang="en-US" dirty="0"/>
-              <a:t>Capacity</a:t>
+              <a:t>How long did I spend on the phone with support to set up the software? (Usability)</a:t>
             </a:r>
           </a:p>
           <a:p>
             <a:pPr lvl="1"/>
             <a:r>
               <a:rPr lang="en-US" dirty="0"/>
-              <a:t>Efficiency</a:t>
-            </a:r>
-          </a:p>
-          <a:p>
-            <a:pPr lvl="1"/>
-            <a:r>
-              <a:rPr lang="en-US" dirty="0"/>
-              <a:t>Performance</a:t>
-            </a:r>
-          </a:p>
-          <a:p>
-            <a:pPr lvl="1"/>
-            <a:r>
-              <a:rPr lang="en-US" dirty="0"/>
-              <a:t>Privacy</a:t>
-            </a:r>
-          </a:p>
-          <a:p>
-            <a:pPr lvl="1"/>
-            <a:r>
-              <a:rPr lang="en-US" dirty="0"/>
-              <a:t>Response Time</a:t>
-            </a:r>
-          </a:p>
-          <a:p>
-            <a:pPr lvl="1"/>
-            <a:r>
-              <a:rPr lang="en-US" dirty="0"/>
-              <a:t>Security</a:t>
-            </a:r>
-          </a:p>
-          <a:p>
-            <a:pPr lvl="1"/>
-            <a:r>
-              <a:rPr lang="en-US" dirty="0"/>
-              <a:t>Supportability</a:t>
-            </a:r>
-          </a:p>
-          <a:p>
-            <a:pPr lvl="1"/>
-            <a:r>
-              <a:rPr lang="en-US" dirty="0"/>
-              <a:t>Usability</a:t>
-            </a:r>
-          </a:p>
-          <a:p>
-            <a:r>
-              <a:rPr lang="en-US" dirty="0"/>
-              <a:t>Example: “A 4-core server with 16 GB RAM should be able to service at least 200 simultaneous clients with less than 300ms latency”</a:t>
+              <a:t>Are my files encrypted, or access controlled at all? (Security)</a:t>
             </a:r>
           </a:p>
         </p:txBody>
@@ -12825,7 +12974,7 @@
     </p:spTree>
     <p:extLst>
       <p:ext uri="{BB962C8B-B14F-4D97-AF65-F5344CB8AC3E}">
-        <p14:creationId xmlns:p14="http://schemas.microsoft.com/office/powerpoint/2010/main" val="2709284930"/>
+        <p14:creationId xmlns:p14="http://schemas.microsoft.com/office/powerpoint/2010/main" val="3635116464"/>
       </p:ext>
     </p:extLst>
   </p:cSld>
@@ -12875,84 +13024,7 @@
           <a:p>
             <a:r>
               <a:rPr lang="en-US" dirty="0"/>
-              <a:t>Common Non-Functional Requirements</a:t>
-            </a:r>
-          </a:p>
-        </p:txBody>
-      </p:sp>
-      <p:sp>
-        <p:nvSpPr>
-          <p:cNvPr id="3" name="Content Placeholder 2">
-            <a:extLst>
-              <a:ext uri="{FF2B5EF4-FFF2-40B4-BE49-F238E27FC236}">
-                <a16:creationId xmlns:a16="http://schemas.microsoft.com/office/drawing/2014/main" id="{E9F968A6-CC31-4AE6-83F3-85021744E177}"/>
-              </a:ext>
-            </a:extLst>
-          </p:cNvPr>
-          <p:cNvSpPr>
-            <a:spLocks noGrp="1"/>
-          </p:cNvSpPr>
-          <p:nvPr>
-            <p:ph idx="1"/>
-          </p:nvPr>
-        </p:nvSpPr>
-        <p:spPr>
-          <a:xfrm>
-            <a:off x="838200" y="1500160"/>
-            <a:ext cx="10515600" cy="4351338"/>
-          </a:xfrm>
-        </p:spPr>
-        <p:txBody>
-          <a:bodyPr>
-            <a:normAutofit/>
-          </a:bodyPr>
-          <a:lstStyle/>
-          <a:p>
-            <a:r>
-              <a:rPr lang="en-US" dirty="0"/>
-              <a:t>Qualities that reflect the evolution of the system</a:t>
-            </a:r>
-          </a:p>
-          <a:p>
-            <a:pPr lvl="1"/>
-            <a:r>
-              <a:rPr lang="en-US" dirty="0"/>
-              <a:t>Testability</a:t>
-            </a:r>
-          </a:p>
-          <a:p>
-            <a:pPr lvl="1"/>
-            <a:r>
-              <a:rPr lang="en-US" dirty="0"/>
-              <a:t>Maintainability</a:t>
-            </a:r>
-          </a:p>
-          <a:p>
-            <a:pPr lvl="1"/>
-            <a:r>
-              <a:rPr lang="en-US" dirty="0"/>
-              <a:t>Extensibility</a:t>
-            </a:r>
-          </a:p>
-          <a:p>
-            <a:pPr lvl="1"/>
-            <a:r>
-              <a:rPr lang="en-US" dirty="0"/>
-              <a:t>Scalability</a:t>
-            </a:r>
-          </a:p>
-          <a:p>
-            <a:r>
-              <a:rPr lang="en-US" dirty="0"/>
-              <a:t>Example: “A 3</a:t>
-            </a:r>
-            <a:r>
-              <a:rPr lang="en-US" baseline="30000" dirty="0"/>
-              <a:t>rd</a:t>
-            </a:r>
-            <a:r>
-              <a:rPr lang="en-US" dirty="0"/>
-              <a:t> party component built conforming to the API defined in XYZ can interface with the backup system and access files on behalf of a user”</a:t>
+              <a:t>Requirements: Which to pick?</a:t>
             </a:r>
           </a:p>
         </p:txBody>
@@ -12981,93 +13053,6 @@
             <a:fld id="{20F37917-FD3A-4669-9018-DA04BCDD3D75}" type="slidenum">
               <a:rPr lang="en-US" smtClean="0"/>
               <a:t>18</a:t>
-            </a:fld>
-            <a:endParaRPr lang="en-US"/>
-          </a:p>
-        </p:txBody>
-      </p:sp>
-    </p:spTree>
-    <p:extLst>
-      <p:ext uri="{BB962C8B-B14F-4D97-AF65-F5344CB8AC3E}">
-        <p14:creationId xmlns:p14="http://schemas.microsoft.com/office/powerpoint/2010/main" val="667178669"/>
-      </p:ext>
-    </p:extLst>
-  </p:cSld>
-  <p:clrMapOvr>
-    <a:masterClrMapping/>
-  </p:clrMapOvr>
-</p:sld>
-</file>
-
-<file path=ppt/slides/slide19.xml><?xml version="1.0" encoding="utf-8"?>
-<p:sld xmlns:a="http://schemas.openxmlformats.org/drawingml/2006/main" xmlns:r="http://schemas.openxmlformats.org/officeDocument/2006/relationships" xmlns:p="http://schemas.openxmlformats.org/presentationml/2006/main">
-  <p:cSld>
-    <p:spTree>
-      <p:nvGrpSpPr>
-        <p:cNvPr id="1" name=""/>
-        <p:cNvGrpSpPr/>
-        <p:nvPr/>
-      </p:nvGrpSpPr>
-      <p:grpSpPr>
-        <a:xfrm>
-          <a:off x="0" y="0"/>
-          <a:ext cx="0" cy="0"/>
-          <a:chOff x="0" y="0"/>
-          <a:chExt cx="0" cy="0"/>
-        </a:xfrm>
-      </p:grpSpPr>
-      <p:sp>
-        <p:nvSpPr>
-          <p:cNvPr id="2" name="Title 1">
-            <a:extLst>
-              <a:ext uri="{FF2B5EF4-FFF2-40B4-BE49-F238E27FC236}">
-                <a16:creationId xmlns:a16="http://schemas.microsoft.com/office/drawing/2014/main" id="{16F86D58-152F-496B-BA81-FDA5B100832A}"/>
-              </a:ext>
-            </a:extLst>
-          </p:cNvPr>
-          <p:cNvSpPr>
-            <a:spLocks noGrp="1"/>
-          </p:cNvSpPr>
-          <p:nvPr>
-            <p:ph type="title"/>
-          </p:nvPr>
-        </p:nvSpPr>
-        <p:spPr/>
-        <p:txBody>
-          <a:bodyPr/>
-          <a:lstStyle/>
-          <a:p>
-            <a:r>
-              <a:rPr lang="en-US" dirty="0"/>
-              <a:t>Requirements: Which to pick?</a:t>
-            </a:r>
-          </a:p>
-        </p:txBody>
-      </p:sp>
-      <p:sp>
-        <p:nvSpPr>
-          <p:cNvPr id="4" name="Slide Number Placeholder 3">
-            <a:extLst>
-              <a:ext uri="{FF2B5EF4-FFF2-40B4-BE49-F238E27FC236}">
-                <a16:creationId xmlns:a16="http://schemas.microsoft.com/office/drawing/2014/main" id="{C7C3DEB3-F948-4B7E-8BDA-FB7ABCF7A993}"/>
-              </a:ext>
-            </a:extLst>
-          </p:cNvPr>
-          <p:cNvSpPr>
-            <a:spLocks noGrp="1"/>
-          </p:cNvSpPr>
-          <p:nvPr>
-            <p:ph type="sldNum" sz="quarter" idx="12"/>
-          </p:nvPr>
-        </p:nvSpPr>
-        <p:spPr/>
-        <p:txBody>
-          <a:bodyPr/>
-          <a:lstStyle/>
-          <a:p>
-            <a:fld id="{20F37917-FD3A-4669-9018-DA04BCDD3D75}" type="slidenum">
-              <a:rPr lang="en-US" smtClean="0"/>
-              <a:t>19</a:t>
             </a:fld>
             <a:endParaRPr lang="en-US"/>
           </a:p>
@@ -13209,6 +13194,154 @@
     <p:extLst>
       <p:ext uri="{BB962C8B-B14F-4D97-AF65-F5344CB8AC3E}">
         <p14:creationId xmlns:p14="http://schemas.microsoft.com/office/powerpoint/2010/main" val="537342029"/>
+      </p:ext>
+    </p:extLst>
+  </p:cSld>
+  <p:clrMapOvr>
+    <a:masterClrMapping/>
+  </p:clrMapOvr>
+</p:sld>
+</file>
+
+<file path=ppt/slides/slide19.xml><?xml version="1.0" encoding="utf-8"?>
+<p:sld xmlns:a="http://schemas.openxmlformats.org/drawingml/2006/main" xmlns:r="http://schemas.openxmlformats.org/officeDocument/2006/relationships" xmlns:p="http://schemas.openxmlformats.org/presentationml/2006/main">
+  <p:cSld>
+    <p:spTree>
+      <p:nvGrpSpPr>
+        <p:cNvPr id="1" name=""/>
+        <p:cNvGrpSpPr/>
+        <p:nvPr/>
+      </p:nvGrpSpPr>
+      <p:grpSpPr>
+        <a:xfrm>
+          <a:off x="0" y="0"/>
+          <a:ext cx="0" cy="0"/>
+          <a:chOff x="0" y="0"/>
+          <a:chExt cx="0" cy="0"/>
+        </a:xfrm>
+      </p:grpSpPr>
+      <p:sp>
+        <p:nvSpPr>
+          <p:cNvPr id="2" name="Title 1">
+            <a:extLst>
+              <a:ext uri="{FF2B5EF4-FFF2-40B4-BE49-F238E27FC236}">
+                <a16:creationId xmlns:a16="http://schemas.microsoft.com/office/drawing/2014/main" id="{E743D407-5B53-49A7-9907-E801EA7FFD8E}"/>
+              </a:ext>
+            </a:extLst>
+          </p:cNvPr>
+          <p:cNvSpPr>
+            <a:spLocks noGrp="1"/>
+          </p:cNvSpPr>
+          <p:nvPr>
+            <p:ph type="title"/>
+          </p:nvPr>
+        </p:nvSpPr>
+        <p:spPr/>
+        <p:txBody>
+          <a:bodyPr/>
+          <a:lstStyle/>
+          <a:p>
+            <a:r>
+              <a:rPr lang="en-US" dirty="0"/>
+              <a:t>Learning Goals for this Lesson</a:t>
+            </a:r>
+          </a:p>
+        </p:txBody>
+      </p:sp>
+      <p:sp>
+        <p:nvSpPr>
+          <p:cNvPr id="3" name="Content Placeholder 2">
+            <a:extLst>
+              <a:ext uri="{FF2B5EF4-FFF2-40B4-BE49-F238E27FC236}">
+                <a16:creationId xmlns:a16="http://schemas.microsoft.com/office/drawing/2014/main" id="{AC300E2B-BFD0-4090-AFC5-FE82683F997F}"/>
+              </a:ext>
+            </a:extLst>
+          </p:cNvPr>
+          <p:cNvSpPr>
+            <a:spLocks noGrp="1"/>
+          </p:cNvSpPr>
+          <p:nvPr>
+            <p:ph idx="1"/>
+          </p:nvPr>
+        </p:nvSpPr>
+        <p:spPr>
+          <a:xfrm>
+            <a:off x="838199" y="1500160"/>
+            <a:ext cx="10515599" cy="4351338"/>
+          </a:xfrm>
+        </p:spPr>
+        <p:txBody>
+          <a:bodyPr/>
+          <a:lstStyle/>
+          <a:p>
+            <a:r>
+              <a:rPr lang="en-US" dirty="0"/>
+              <a:t>At the end of this lesson, you should be able to</a:t>
+            </a:r>
+          </a:p>
+          <a:p>
+            <a:pPr lvl="1"/>
+            <a:r>
+              <a:rPr lang="en-US" dirty="0"/>
+              <a:t>Explain the overall purposes of requirements analysis</a:t>
+            </a:r>
+          </a:p>
+          <a:p>
+            <a:pPr lvl="1"/>
+            <a:r>
+              <a:rPr lang="en-US" dirty="0"/>
+              <a:t>Enumerate and explain 3 major dimensions of risk in Requirements Analysis</a:t>
+            </a:r>
+          </a:p>
+          <a:p>
+            <a:pPr lvl="1"/>
+            <a:r>
+              <a:rPr lang="en-US" dirty="0"/>
+              <a:t>Explain the difference between functional and non-functional requirements, and give examples of each  </a:t>
+            </a:r>
+          </a:p>
+          <a:p>
+            <a:pPr lvl="1"/>
+            <a:r>
+              <a:rPr lang="en-US" dirty="0"/>
+              <a:t>Explain the notion of a user story, with examples.  (including conditions of satisfaction)</a:t>
+            </a:r>
+          </a:p>
+        </p:txBody>
+      </p:sp>
+      <p:sp>
+        <p:nvSpPr>
+          <p:cNvPr id="4" name="Slide Number Placeholder 3">
+            <a:extLst>
+              <a:ext uri="{FF2B5EF4-FFF2-40B4-BE49-F238E27FC236}">
+                <a16:creationId xmlns:a16="http://schemas.microsoft.com/office/drawing/2014/main" id="{B7BF3F82-6F96-41E0-9C15-23CE00076176}"/>
+              </a:ext>
+            </a:extLst>
+          </p:cNvPr>
+          <p:cNvSpPr>
+            <a:spLocks noGrp="1"/>
+          </p:cNvSpPr>
+          <p:nvPr>
+            <p:ph type="sldNum" sz="quarter" idx="12"/>
+          </p:nvPr>
+        </p:nvSpPr>
+        <p:spPr/>
+        <p:txBody>
+          <a:bodyPr/>
+          <a:lstStyle/>
+          <a:p>
+            <a:fld id="{20F37917-FD3A-4669-9018-DA04BCDD3D75}" type="slidenum">
+              <a:rPr lang="en-US" smtClean="0"/>
+              <a:t>19</a:t>
+            </a:fld>
+            <a:endParaRPr lang="en-US"/>
+          </a:p>
+        </p:txBody>
+      </p:sp>
+    </p:spTree>
+    <p:extLst>
+      <p:ext uri="{BB962C8B-B14F-4D97-AF65-F5344CB8AC3E}">
+        <p14:creationId xmlns:p14="http://schemas.microsoft.com/office/powerpoint/2010/main" val="673410589"/>
       </p:ext>
     </p:extLst>
   </p:cSld>
@@ -13462,7 +13595,12 @@
             <p:ph idx="1"/>
           </p:nvPr>
         </p:nvSpPr>
-        <p:spPr/>
+        <p:spPr>
+          <a:xfrm>
+            <a:off x="838199" y="1500160"/>
+            <a:ext cx="10515599" cy="4351338"/>
+          </a:xfrm>
+        </p:spPr>
         <p:txBody>
           <a:bodyPr/>
           <a:lstStyle/>
@@ -13476,28 +13614,28 @@
             <a:pPr lvl="1"/>
             <a:r>
               <a:rPr lang="en-US" dirty="0"/>
-              <a:t>explain why design is important</a:t>
+              <a:t>Explain the overall purposes of requirements analysis</a:t>
             </a:r>
           </a:p>
           <a:p>
             <a:pPr lvl="1"/>
             <a:r>
               <a:rPr lang="en-US" dirty="0"/>
-              <a:t>identify three different scales of design</a:t>
+              <a:t>Enumerate and explain 3 major dimensions of risk in Requirements Analysis</a:t>
             </a:r>
           </a:p>
           <a:p>
             <a:pPr lvl="1"/>
             <a:r>
               <a:rPr lang="en-US" dirty="0"/>
-              <a:t>for each of the scales:</a:t>
-            </a:r>
-          </a:p>
-          <a:p>
-            <a:pPr lvl="2"/>
-            <a:r>
-              <a:rPr lang="en-US" dirty="0"/>
-              <a:t>be able to give examples of vocabulary words at each scale</a:t>
+              <a:t>Explain the difference between functional and non-functional requirements, and give examples of each  </a:t>
+            </a:r>
+          </a:p>
+          <a:p>
+            <a:pPr lvl="1"/>
+            <a:r>
+              <a:rPr lang="en-US" dirty="0"/>
+              <a:t>Explain the notion of a user story, with examples.  (including conditions of satisfaction)</a:t>
             </a:r>
           </a:p>
         </p:txBody>
@@ -13528,71 +13666,6 @@
               <a:t>3</a:t>
             </a:fld>
             <a:endParaRPr lang="en-US"/>
-          </a:p>
-        </p:txBody>
-      </p:sp>
-      <p:sp>
-        <p:nvSpPr>
-          <p:cNvPr id="5" name="TextBox 4">
-            <a:extLst>
-              <a:ext uri="{FF2B5EF4-FFF2-40B4-BE49-F238E27FC236}">
-                <a16:creationId xmlns:a16="http://schemas.microsoft.com/office/drawing/2014/main" id="{8CF12720-26FE-E242-9384-F836843CC352}"/>
-              </a:ext>
-            </a:extLst>
-          </p:cNvPr>
-          <p:cNvSpPr txBox="1"/>
-          <p:nvPr/>
-        </p:nvSpPr>
-        <p:spPr>
-          <a:xfrm>
-            <a:off x="9151775" y="1500160"/>
-            <a:ext cx="2202025" cy="1436914"/>
-          </a:xfrm>
-          <a:prstGeom prst="rect">
-            <a:avLst/>
-          </a:prstGeom>
-          <a:noFill/>
-          <a:ln>
-            <a:noFill/>
-          </a:ln>
-        </p:spPr>
-        <p:style>
-          <a:lnRef idx="2">
-            <a:schemeClr val="accent1">
-              <a:shade val="50000"/>
-            </a:schemeClr>
-          </a:lnRef>
-          <a:fillRef idx="1">
-            <a:schemeClr val="accent1"/>
-          </a:fillRef>
-          <a:effectRef idx="0">
-            <a:schemeClr val="accent1"/>
-          </a:effectRef>
-          <a:fontRef idx="minor">
-            <a:schemeClr val="lt1"/>
-          </a:fontRef>
-        </p:style>
-        <p:txBody>
-          <a:bodyPr rot="0" spcFirstLastPara="0" vertOverflow="overflow" horzOverflow="overflow" vert="horz" wrap="square" lIns="91440" tIns="45720" rIns="91440" bIns="45720" numCol="1" spcCol="0" rtlCol="0" fromWordArt="0" anchor="ctr" anchorCtr="0" forceAA="0" compatLnSpc="1">
-            <a:prstTxWarp prst="textNoShape">
-              <a:avLst/>
-            </a:prstTxWarp>
-            <a:noAutofit/>
-          </a:bodyPr>
-          <a:lstStyle/>
-          <a:p>
-            <a:pPr algn="l"/>
-            <a:r>
-              <a:rPr lang="en-US" sz="4800" dirty="0">
-                <a:solidFill>
-                  <a:schemeClr val="tx1"/>
-                </a:solidFill>
-                <a:highlight>
-                  <a:srgbClr val="FFFF00"/>
-                </a:highlight>
-              </a:rPr>
-              <a:t>TODO</a:t>
-            </a:r>
           </a:p>
         </p:txBody>
       </p:sp>
@@ -14059,48 +14132,18 @@
       </p:grpSpPr>
       <p:sp>
         <p:nvSpPr>
-          <p:cNvPr id="2" name="Title 1">
+          <p:cNvPr id="5121" name="Rectangle 1">
             <a:extLst>
               <a:ext uri="{FF2B5EF4-FFF2-40B4-BE49-F238E27FC236}">
-                <a16:creationId xmlns:a16="http://schemas.microsoft.com/office/drawing/2014/main" id="{EE06A195-BA59-40E7-8521-87B75EE15054}"/>
+                <a16:creationId xmlns:a16="http://schemas.microsoft.com/office/drawing/2014/main" id="{FCD54966-636B-40B8-9A0B-F5A7E500E446}"/>
               </a:ext>
             </a:extLst>
           </p:cNvPr>
           <p:cNvSpPr>
-            <a:spLocks noGrp="1"/>
+            <a:spLocks noGrp="1" noChangeArrowheads="1"/>
           </p:cNvSpPr>
           <p:nvPr>
             <p:ph type="title"/>
-          </p:nvPr>
-        </p:nvSpPr>
-        <p:spPr/>
-        <p:txBody>
-          <a:bodyPr>
-            <a:normAutofit/>
-          </a:bodyPr>
-          <a:lstStyle/>
-          <a:p>
-            <a:r>
-              <a:rPr lang="en-US" dirty="0"/>
-              <a:t>What has changed in the past 50 years?</a:t>
-            </a:r>
-          </a:p>
-        </p:txBody>
-      </p:sp>
-      <p:sp>
-        <p:nvSpPr>
-          <p:cNvPr id="4" name="Slide Number Placeholder 3">
-            <a:extLst>
-              <a:ext uri="{FF2B5EF4-FFF2-40B4-BE49-F238E27FC236}">
-                <a16:creationId xmlns:a16="http://schemas.microsoft.com/office/drawing/2014/main" id="{2257FCDD-253D-4273-9467-54F4E684C4C6}"/>
-              </a:ext>
-            </a:extLst>
-          </p:cNvPr>
-          <p:cNvSpPr>
-            <a:spLocks noGrp="1"/>
-          </p:cNvSpPr>
-          <p:nvPr>
-            <p:ph type="sldNum" sz="quarter" idx="12"/>
           </p:nvPr>
         </p:nvSpPr>
         <p:spPr/>
@@ -14108,183 +14151,9 @@
           <a:bodyPr/>
           <a:lstStyle/>
           <a:p>
-            <a:fld id="{20F37917-FD3A-4669-9018-DA04BCDD3D75}" type="slidenum">
-              <a:rPr lang="en-US" smtClean="0"/>
-              <a:t>5</a:t>
-            </a:fld>
-            <a:endParaRPr lang="en-US"/>
-          </a:p>
-        </p:txBody>
-      </p:sp>
-      <p:pic>
-        <p:nvPicPr>
-          <p:cNvPr id="1026" name="Picture 2">
-            <a:extLst>
-              <a:ext uri="{FF2B5EF4-FFF2-40B4-BE49-F238E27FC236}">
-                <a16:creationId xmlns:a16="http://schemas.microsoft.com/office/drawing/2014/main" id="{4544C0FE-8988-6149-9291-9DA7124BEE40}"/>
-              </a:ext>
-            </a:extLst>
-          </p:cNvPr>
-          <p:cNvPicPr>
-            <a:picLocks noChangeAspect="1" noChangeArrowheads="1"/>
-          </p:cNvPicPr>
-          <p:nvPr/>
-        </p:nvPicPr>
-        <p:blipFill>
-          <a:blip r:embed="rId3">
-            <a:extLst>
-              <a:ext uri="{28A0092B-C50C-407E-A947-70E740481C1C}">
-                <a14:useLocalDpi xmlns:a14="http://schemas.microsoft.com/office/drawing/2010/main" val="0"/>
-              </a:ext>
-            </a:extLst>
-          </a:blip>
-          <a:srcRect/>
-          <a:stretch>
-            <a:fillRect/>
-          </a:stretch>
-        </p:blipFill>
-        <p:spPr bwMode="auto">
-          <a:xfrm>
-            <a:off x="2609850" y="1646634"/>
-            <a:ext cx="6972300" cy="4406900"/>
-          </a:xfrm>
-          <a:prstGeom prst="rect">
-            <a:avLst/>
-          </a:prstGeom>
-          <a:noFill/>
-          <a:extLst>
-            <a:ext uri="{909E8E84-426E-40DD-AFC4-6F175D3DCCD1}">
-              <a14:hiddenFill xmlns:a14="http://schemas.microsoft.com/office/drawing/2010/main">
-                <a:solidFill>
-                  <a:srgbClr val="FFFFFF"/>
-                </a:solidFill>
-              </a14:hiddenFill>
-            </a:ext>
-          </a:extLst>
-        </p:spPr>
-      </p:pic>
-      <p:sp>
-        <p:nvSpPr>
-          <p:cNvPr id="3" name="TextBox 2">
-            <a:extLst>
-              <a:ext uri="{FF2B5EF4-FFF2-40B4-BE49-F238E27FC236}">
-                <a16:creationId xmlns:a16="http://schemas.microsoft.com/office/drawing/2014/main" id="{A06E0F4D-4DB6-4A40-9DA6-3A1D7F76A50B}"/>
-              </a:ext>
-            </a:extLst>
-          </p:cNvPr>
-          <p:cNvSpPr txBox="1"/>
-          <p:nvPr/>
-        </p:nvSpPr>
-        <p:spPr>
-          <a:xfrm>
-            <a:off x="7910804" y="6031625"/>
-            <a:ext cx="3080657" cy="507287"/>
-          </a:xfrm>
-          <a:prstGeom prst="rect">
-            <a:avLst/>
-          </a:prstGeom>
-          <a:noFill/>
-          <a:ln>
-            <a:noFill/>
-          </a:ln>
-        </p:spPr>
-        <p:style>
-          <a:lnRef idx="2">
-            <a:schemeClr val="accent1">
-              <a:shade val="50000"/>
-            </a:schemeClr>
-          </a:lnRef>
-          <a:fillRef idx="1">
-            <a:schemeClr val="accent1"/>
-          </a:fillRef>
-          <a:effectRef idx="0">
-            <a:schemeClr val="accent1"/>
-          </a:effectRef>
-          <a:fontRef idx="minor">
-            <a:schemeClr val="lt1"/>
-          </a:fontRef>
-        </p:style>
-        <p:txBody>
-          <a:bodyPr rot="0" spcFirstLastPara="0" vertOverflow="overflow" horzOverflow="overflow" vert="horz" wrap="square" lIns="91440" tIns="45720" rIns="91440" bIns="45720" numCol="1" spcCol="0" rtlCol="0" fromWordArt="0" anchor="ctr" anchorCtr="0" forceAA="0" compatLnSpc="1">
-            <a:prstTxWarp prst="textNoShape">
-              <a:avLst/>
-            </a:prstTxWarp>
-            <a:noAutofit/>
-          </a:bodyPr>
-          <a:lstStyle/>
-          <a:p>
-            <a:pPr algn="l"/>
-            <a:r>
-              <a:rPr lang="en-US" dirty="0">
-                <a:solidFill>
-                  <a:schemeClr val="tx1"/>
-                </a:solidFill>
-                <a:hlinkClick r:id="rId4"/>
-              </a:rPr>
-              <a:t>History of the tire swing meme</a:t>
-            </a:r>
-            <a:endParaRPr lang="en-US" dirty="0">
-              <a:solidFill>
-                <a:schemeClr val="tx1"/>
-              </a:solidFill>
-            </a:endParaRPr>
-          </a:p>
-        </p:txBody>
-      </p:sp>
-    </p:spTree>
-    <p:extLst>
-      <p:ext uri="{BB962C8B-B14F-4D97-AF65-F5344CB8AC3E}">
-        <p14:creationId xmlns:p14="http://schemas.microsoft.com/office/powerpoint/2010/main" val="163549773"/>
-      </p:ext>
-    </p:extLst>
-  </p:cSld>
-  <p:clrMapOvr>
-    <a:masterClrMapping/>
-  </p:clrMapOvr>
-</p:sld>
-</file>
-
-<file path=ppt/slides/slide6.xml><?xml version="1.0" encoding="utf-8"?>
-<p:sld xmlns:a="http://schemas.openxmlformats.org/drawingml/2006/main" xmlns:r="http://schemas.openxmlformats.org/officeDocument/2006/relationships" xmlns:p="http://schemas.openxmlformats.org/presentationml/2006/main">
-  <p:cSld>
-    <p:spTree>
-      <p:nvGrpSpPr>
-        <p:cNvPr id="1" name=""/>
-        <p:cNvGrpSpPr/>
-        <p:nvPr/>
-      </p:nvGrpSpPr>
-      <p:grpSpPr>
-        <a:xfrm>
-          <a:off x="0" y="0"/>
-          <a:ext cx="0" cy="0"/>
-          <a:chOff x="0" y="0"/>
-          <a:chExt cx="0" cy="0"/>
-        </a:xfrm>
-      </p:grpSpPr>
-      <p:sp>
-        <p:nvSpPr>
-          <p:cNvPr id="5121" name="Rectangle 1">
-            <a:extLst>
-              <a:ext uri="{FF2B5EF4-FFF2-40B4-BE49-F238E27FC236}">
-                <a16:creationId xmlns:a16="http://schemas.microsoft.com/office/drawing/2014/main" id="{FCD54966-636B-40B8-9A0B-F5A7E500E446}"/>
-              </a:ext>
-            </a:extLst>
-          </p:cNvPr>
-          <p:cNvSpPr>
-            <a:spLocks noGrp="1" noChangeArrowheads="1"/>
-          </p:cNvSpPr>
-          <p:nvPr>
-            <p:ph type="title"/>
-          </p:nvPr>
-        </p:nvSpPr>
-        <p:spPr/>
-        <p:txBody>
-          <a:bodyPr/>
-          <a:lstStyle/>
-          <a:p>
             <a:r>
               <a:rPr lang="en-US" altLang="en-US" dirty="0"/>
-              <a:t>Why is requirements engineering hard?</a:t>
+              <a:t>Why is requirements analysis hard?</a:t>
             </a:r>
           </a:p>
         </p:txBody>
@@ -14303,6 +14172,11 @@
           </p:cNvGraphicFramePr>
           <p:nvPr>
             <p:ph idx="1"/>
+            <p:extLst>
+              <p:ext uri="{D42A27DB-BD31-4B8C-83A1-F6EECF244321}">
+                <p14:modId xmlns:p14="http://schemas.microsoft.com/office/powerpoint/2010/main" val="4251173487"/>
+              </p:ext>
+            </p:extLst>
           </p:nvPr>
         </p:nvGraphicFramePr>
         <p:xfrm>
@@ -14387,7 +14261,7 @@
                 <a:sym typeface="Helvetica Neue" charset="0"/>
               </a:rPr>
               <a:pPr algn="r"/>
-              <a:t>6</a:t>
+              <a:t>5</a:t>
             </a:fld>
             <a:endParaRPr lang="en-US" altLang="en-US" sz="984" dirty="0">
               <a:latin typeface="Calibri Light" panose="020F0302020204030204" pitchFamily="34" charset="0"/>
@@ -14494,7 +14368,7 @@
 </p:sld>
 </file>
 
-<file path=ppt/slides/slide7.xml><?xml version="1.0" encoding="utf-8"?>
+<file path=ppt/slides/slide6.xml><?xml version="1.0" encoding="utf-8"?>
 <p:sld xmlns:a="http://schemas.openxmlformats.org/drawingml/2006/main" xmlns:r="http://schemas.openxmlformats.org/officeDocument/2006/relationships" xmlns:p="http://schemas.openxmlformats.org/presentationml/2006/main">
   <p:cSld>
     <p:bg>
@@ -14842,7 +14716,7 @@
                   <a:spcPts val="600"/>
                 </a:spcAft>
               </a:pPr>
-              <a:t>7</a:t>
+              <a:t>6</a:t>
             </a:fld>
             <a:endParaRPr lang="en-US"/>
           </a:p>
@@ -14861,7 +14735,7 @@
 </p:sld>
 </file>
 
-<file path=ppt/slides/slide8.xml><?xml version="1.0" encoding="utf-8"?>
+<file path=ppt/slides/slide7.xml><?xml version="1.0" encoding="utf-8"?>
 <p:sld xmlns:a="http://schemas.openxmlformats.org/drawingml/2006/main" xmlns:r="http://schemas.openxmlformats.org/officeDocument/2006/relationships" xmlns:p="http://schemas.openxmlformats.org/presentationml/2006/main">
   <p:cSld>
     <p:bg>
@@ -15104,7 +14978,7 @@
                   <a:spcPts val="600"/>
                 </a:spcAft>
               </a:pPr>
-              <a:t>8</a:t>
+              <a:t>7</a:t>
             </a:fld>
             <a:endParaRPr lang="en-US">
               <a:solidFill>
@@ -15130,7 +15004,7 @@
 </p:sld>
 </file>
 
-<file path=ppt/slides/slide9.xml><?xml version="1.0" encoding="utf-8"?>
+<file path=ppt/slides/slide8.xml><?xml version="1.0" encoding="utf-8"?>
 <p:sld xmlns:a="http://schemas.openxmlformats.org/drawingml/2006/main" xmlns:r="http://schemas.openxmlformats.org/officeDocument/2006/relationships" xmlns:p="http://schemas.openxmlformats.org/presentationml/2006/main">
   <p:cSld>
     <p:bg>
@@ -15244,8 +15118,8 @@
           <a:lstStyle/>
           <a:p>
             <a:r>
-              <a:rPr lang="en-US" sz="3400"/>
-              <a:t>Addressing Problems of Understanding: Documentation</a:t>
+              <a:rPr lang="en-US" sz="3400" dirty="0"/>
+              <a:t>Documentation can help us address problems of understanding</a:t>
             </a:r>
           </a:p>
         </p:txBody>
@@ -15781,7 +15655,7 @@
                   <a:spcPts val="600"/>
                 </a:spcAft>
               </a:pPr>
-              <a:t>9</a:t>
+              <a:t>8</a:t>
             </a:fld>
             <a:endParaRPr lang="en-US">
               <a:solidFill>
@@ -15795,6 +15669,204 @@
     <p:extLst>
       <p:ext uri="{BB962C8B-B14F-4D97-AF65-F5344CB8AC3E}">
         <p14:creationId xmlns:p14="http://schemas.microsoft.com/office/powerpoint/2010/main" val="2236293370"/>
+      </p:ext>
+    </p:extLst>
+  </p:cSld>
+  <p:clrMapOvr>
+    <a:masterClrMapping/>
+  </p:clrMapOvr>
+</p:sld>
+</file>
+
+<file path=ppt/slides/slide9.xml><?xml version="1.0" encoding="utf-8"?>
+<p:sld xmlns:a="http://schemas.openxmlformats.org/drawingml/2006/main" xmlns:r="http://schemas.openxmlformats.org/officeDocument/2006/relationships" xmlns:p="http://schemas.openxmlformats.org/presentationml/2006/main">
+  <p:cSld>
+    <p:spTree>
+      <p:nvGrpSpPr>
+        <p:cNvPr id="1" name=""/>
+        <p:cNvGrpSpPr/>
+        <p:nvPr/>
+      </p:nvGrpSpPr>
+      <p:grpSpPr>
+        <a:xfrm>
+          <a:off x="0" y="0"/>
+          <a:ext cx="0" cy="0"/>
+          <a:chOff x="0" y="0"/>
+          <a:chExt cx="0" cy="0"/>
+        </a:xfrm>
+      </p:grpSpPr>
+      <p:sp>
+        <p:nvSpPr>
+          <p:cNvPr id="2" name="Title 1">
+            <a:extLst>
+              <a:ext uri="{FF2B5EF4-FFF2-40B4-BE49-F238E27FC236}">
+                <a16:creationId xmlns:a16="http://schemas.microsoft.com/office/drawing/2014/main" id="{16F86D58-152F-496B-BA81-FDA5B100832A}"/>
+              </a:ext>
+            </a:extLst>
+          </p:cNvPr>
+          <p:cNvSpPr>
+            <a:spLocks noGrp="1"/>
+          </p:cNvSpPr>
+          <p:nvPr>
+            <p:ph type="title"/>
+          </p:nvPr>
+        </p:nvSpPr>
+        <p:spPr/>
+        <p:txBody>
+          <a:bodyPr/>
+          <a:lstStyle/>
+          <a:p>
+            <a:r>
+              <a:rPr lang="en-US" dirty="0"/>
+              <a:t>Documentation should also capture non-functional requirements</a:t>
+            </a:r>
+          </a:p>
+        </p:txBody>
+      </p:sp>
+      <p:sp>
+        <p:nvSpPr>
+          <p:cNvPr id="3" name="Content Placeholder 2">
+            <a:extLst>
+              <a:ext uri="{FF2B5EF4-FFF2-40B4-BE49-F238E27FC236}">
+                <a16:creationId xmlns:a16="http://schemas.microsoft.com/office/drawing/2014/main" id="{E9F968A6-CC31-4AE6-83F3-85021744E177}"/>
+              </a:ext>
+            </a:extLst>
+          </p:cNvPr>
+          <p:cNvSpPr>
+            <a:spLocks noGrp="1"/>
+          </p:cNvSpPr>
+          <p:nvPr>
+            <p:ph idx="1"/>
+          </p:nvPr>
+        </p:nvSpPr>
+        <p:spPr>
+          <a:xfrm>
+            <a:off x="838200" y="1500160"/>
+            <a:ext cx="10515600" cy="4351338"/>
+          </a:xfrm>
+        </p:spPr>
+        <p:txBody>
+          <a:bodyPr>
+            <a:normAutofit fontScale="92500" lnSpcReduction="20000"/>
+          </a:bodyPr>
+          <a:lstStyle/>
+          <a:p>
+            <a:r>
+              <a:rPr lang="en-US" dirty="0"/>
+              <a:t>Qualities that reflect the execution of the system</a:t>
+            </a:r>
+          </a:p>
+          <a:p>
+            <a:pPr lvl="1"/>
+            <a:r>
+              <a:rPr lang="en-US" dirty="0"/>
+              <a:t>Accessibility</a:t>
+            </a:r>
+          </a:p>
+          <a:p>
+            <a:pPr lvl="1"/>
+            <a:r>
+              <a:rPr lang="en-US" dirty="0"/>
+              <a:t>Availability</a:t>
+            </a:r>
+          </a:p>
+          <a:p>
+            <a:pPr lvl="1"/>
+            <a:r>
+              <a:rPr lang="en-US" dirty="0"/>
+              <a:t>Capacity</a:t>
+            </a:r>
+          </a:p>
+          <a:p>
+            <a:pPr lvl="1"/>
+            <a:r>
+              <a:rPr lang="en-US" dirty="0"/>
+              <a:t>Efficiency</a:t>
+            </a:r>
+          </a:p>
+          <a:p>
+            <a:pPr lvl="1"/>
+            <a:r>
+              <a:rPr lang="en-US" dirty="0"/>
+              <a:t>Performance</a:t>
+            </a:r>
+          </a:p>
+          <a:p>
+            <a:pPr lvl="1"/>
+            <a:r>
+              <a:rPr lang="en-US" dirty="0"/>
+              <a:t>Privacy</a:t>
+            </a:r>
+          </a:p>
+          <a:p>
+            <a:pPr lvl="1"/>
+            <a:r>
+              <a:rPr lang="en-US" dirty="0"/>
+              <a:t>Response Time</a:t>
+            </a:r>
+          </a:p>
+          <a:p>
+            <a:pPr lvl="1"/>
+            <a:r>
+              <a:rPr lang="en-US" dirty="0"/>
+              <a:t>Security</a:t>
+            </a:r>
+          </a:p>
+          <a:p>
+            <a:pPr lvl="1"/>
+            <a:r>
+              <a:rPr lang="en-US" dirty="0"/>
+              <a:t>Supportability</a:t>
+            </a:r>
+          </a:p>
+          <a:p>
+            <a:pPr lvl="1"/>
+            <a:r>
+              <a:rPr lang="en-US" dirty="0"/>
+              <a:t>Usability</a:t>
+            </a:r>
+          </a:p>
+          <a:p>
+            <a:r>
+              <a:rPr lang="en-US" dirty="0"/>
+              <a:t>Example: “A 4-core server with 16 GB RAM should be able to service at least 200 simultaneous clients with less than 300ms latency”</a:t>
+            </a:r>
+          </a:p>
+        </p:txBody>
+      </p:sp>
+      <p:sp>
+        <p:nvSpPr>
+          <p:cNvPr id="4" name="Slide Number Placeholder 3">
+            <a:extLst>
+              <a:ext uri="{FF2B5EF4-FFF2-40B4-BE49-F238E27FC236}">
+                <a16:creationId xmlns:a16="http://schemas.microsoft.com/office/drawing/2014/main" id="{C7C3DEB3-F948-4B7E-8BDA-FB7ABCF7A993}"/>
+              </a:ext>
+            </a:extLst>
+          </p:cNvPr>
+          <p:cNvSpPr>
+            <a:spLocks noGrp="1"/>
+          </p:cNvSpPr>
+          <p:nvPr>
+            <p:ph type="sldNum" sz="quarter" idx="12"/>
+          </p:nvPr>
+        </p:nvSpPr>
+        <p:spPr/>
+        <p:txBody>
+          <a:bodyPr/>
+          <a:lstStyle/>
+          <a:p>
+            <a:fld id="{20F37917-FD3A-4669-9018-DA04BCDD3D75}" type="slidenum">
+              <a:rPr lang="en-US" smtClean="0"/>
+              <a:t>9</a:t>
+            </a:fld>
+            <a:endParaRPr lang="en-US"/>
+          </a:p>
+        </p:txBody>
+      </p:sp>
+    </p:spTree>
+    <p:extLst>
+      <p:ext uri="{BB962C8B-B14F-4D97-AF65-F5344CB8AC3E}">
+        <p14:creationId xmlns:p14="http://schemas.microsoft.com/office/powerpoint/2010/main" val="2709284930"/>
       </p:ext>
     </p:extLst>
   </p:cSld>

</xml_diff>